<commit_message>
update SAC and kriging code, presentation
</commit_message>
<xml_diff>
--- a/doc/BCB_Intro_Advanced_Analysis_1_2021.pptx
+++ b/doc/BCB_Intro_Advanced_Analysis_1_2021.pptx
@@ -6,14 +6,14 @@
     <p:sldMasterId id="2147483654" r:id="rId2"/>
   </p:sldMasterIdLst>
   <p:notesMasterIdLst>
-    <p:notesMasterId r:id="rId15"/>
+    <p:notesMasterId r:id="rId16"/>
   </p:notesMasterIdLst>
   <p:sldIdLst>
     <p:sldId id="335" r:id="rId3"/>
     <p:sldId id="415" r:id="rId4"/>
-    <p:sldId id="440" r:id="rId5"/>
-    <p:sldId id="441" r:id="rId6"/>
-    <p:sldId id="442" r:id="rId7"/>
+    <p:sldId id="451" r:id="rId5"/>
+    <p:sldId id="440" r:id="rId6"/>
+    <p:sldId id="452" r:id="rId7"/>
     <p:sldId id="444" r:id="rId8"/>
     <p:sldId id="445" r:id="rId9"/>
     <p:sldId id="446" r:id="rId10"/>
@@ -21,6 +21,7 @@
     <p:sldId id="448" r:id="rId12"/>
     <p:sldId id="449" r:id="rId13"/>
     <p:sldId id="450" r:id="rId14"/>
+    <p:sldId id="442" r:id="rId15"/>
   </p:sldIdLst>
   <p:sldSz cx="9144000" cy="5143500" type="screen16x9"/>
   <p:notesSz cx="6858000" cy="9144000"/>
@@ -230,7 +231,7 @@
           <a:p>
             <a:fld id="{8B3D4395-F4BB-4776-AD1A-E1F7520CF444}" type="datetimeFigureOut">
               <a:rPr lang="en-US" smtClean="0"/>
-              <a:t>4/16/21</a:t>
+              <a:t>4/25/21</a:t>
             </a:fld>
             <a:endParaRPr lang="en-US" dirty="0"/>
           </a:p>
@@ -575,6 +576,217 @@
     <p:extLst>
       <p:ext uri="{BB962C8B-B14F-4D97-AF65-F5344CB8AC3E}">
         <p14:creationId xmlns:p14="http://schemas.microsoft.com/office/powerpoint/2010/main" val="337152456"/>
+      </p:ext>
+    </p:extLst>
+  </p:cSld>
+  <p:clrMapOvr>
+    <a:masterClrMapping/>
+  </p:clrMapOvr>
+</p:notes>
+</file>
+
+<file path=ppt/notesSlides/notesSlide2.xml><?xml version="1.0" encoding="utf-8"?>
+<p:notes xmlns:a="http://schemas.openxmlformats.org/drawingml/2006/main" xmlns:r="http://schemas.openxmlformats.org/officeDocument/2006/relationships" xmlns:p="http://schemas.openxmlformats.org/presentationml/2006/main">
+  <p:cSld>
+    <p:spTree>
+      <p:nvGrpSpPr>
+        <p:cNvPr id="1" name=""/>
+        <p:cNvGrpSpPr/>
+        <p:nvPr/>
+      </p:nvGrpSpPr>
+      <p:grpSpPr>
+        <a:xfrm>
+          <a:off x="0" y="0"/>
+          <a:ext cx="0" cy="0"/>
+          <a:chOff x="0" y="0"/>
+          <a:chExt cx="0" cy="0"/>
+        </a:xfrm>
+      </p:grpSpPr>
+      <p:sp>
+        <p:nvSpPr>
+          <p:cNvPr id="2" name="Slide Image Placeholder 1"/>
+          <p:cNvSpPr>
+            <a:spLocks noGrp="1" noRot="1" noChangeAspect="1"/>
+          </p:cNvSpPr>
+          <p:nvPr>
+            <p:ph type="sldImg"/>
+          </p:nvPr>
+        </p:nvSpPr>
+        <p:spPr/>
+      </p:sp>
+      <p:sp>
+        <p:nvSpPr>
+          <p:cNvPr id="3" name="Notes Placeholder 2"/>
+          <p:cNvSpPr>
+            <a:spLocks noGrp="1"/>
+          </p:cNvSpPr>
+          <p:nvPr>
+            <p:ph type="body" idx="1"/>
+          </p:nvPr>
+        </p:nvSpPr>
+        <p:spPr/>
+        <p:txBody>
+          <a:bodyPr/>
+          <a:lstStyle/>
+          <a:p>
+            <a:r>
+              <a:rPr lang="en-US" dirty="0"/>
+              <a:t>Autocorrelation – correlation of the variable with itself, across space. </a:t>
+            </a:r>
+            <a:r>
+              <a:rPr lang="en-US" dirty="0" err="1"/>
+              <a:t>Eg.</a:t>
+            </a:r>
+            <a:r>
+              <a:rPr lang="en-US" dirty="0"/>
+              <a:t> How are crime rates correlated to other crime rates in space</a:t>
+            </a:r>
+          </a:p>
+        </p:txBody>
+      </p:sp>
+      <p:sp>
+        <p:nvSpPr>
+          <p:cNvPr id="4" name="Slide Number Placeholder 3"/>
+          <p:cNvSpPr>
+            <a:spLocks noGrp="1"/>
+          </p:cNvSpPr>
+          <p:nvPr>
+            <p:ph type="sldNum" sz="quarter" idx="5"/>
+          </p:nvPr>
+        </p:nvSpPr>
+        <p:spPr/>
+        <p:txBody>
+          <a:bodyPr/>
+          <a:lstStyle/>
+          <a:p>
+            <a:fld id="{8B0993E8-77CB-4CE8-8134-9D98A3510F3A}" type="slidenum">
+              <a:rPr lang="en-US" smtClean="0"/>
+              <a:t>4</a:t>
+            </a:fld>
+            <a:endParaRPr lang="en-US" dirty="0"/>
+          </a:p>
+        </p:txBody>
+      </p:sp>
+    </p:spTree>
+    <p:extLst>
+      <p:ext uri="{BB962C8B-B14F-4D97-AF65-F5344CB8AC3E}">
+        <p14:creationId xmlns:p14="http://schemas.microsoft.com/office/powerpoint/2010/main" val="3208246293"/>
+      </p:ext>
+    </p:extLst>
+  </p:cSld>
+  <p:clrMapOvr>
+    <a:masterClrMapping/>
+  </p:clrMapOvr>
+</p:notes>
+</file>
+
+<file path=ppt/notesSlides/notesSlide3.xml><?xml version="1.0" encoding="utf-8"?>
+<p:notes xmlns:a="http://schemas.openxmlformats.org/drawingml/2006/main" xmlns:r="http://schemas.openxmlformats.org/officeDocument/2006/relationships" xmlns:p="http://schemas.openxmlformats.org/presentationml/2006/main">
+  <p:cSld>
+    <p:spTree>
+      <p:nvGrpSpPr>
+        <p:cNvPr id="1" name=""/>
+        <p:cNvGrpSpPr/>
+        <p:nvPr/>
+      </p:nvGrpSpPr>
+      <p:grpSpPr>
+        <a:xfrm>
+          <a:off x="0" y="0"/>
+          <a:ext cx="0" cy="0"/>
+          <a:chOff x="0" y="0"/>
+          <a:chExt cx="0" cy="0"/>
+        </a:xfrm>
+      </p:grpSpPr>
+      <p:sp>
+        <p:nvSpPr>
+          <p:cNvPr id="2" name="Slide Image Placeholder 1"/>
+          <p:cNvSpPr>
+            <a:spLocks noGrp="1" noRot="1" noChangeAspect="1"/>
+          </p:cNvSpPr>
+          <p:nvPr>
+            <p:ph type="sldImg"/>
+          </p:nvPr>
+        </p:nvSpPr>
+        <p:spPr/>
+      </p:sp>
+      <p:sp>
+        <p:nvSpPr>
+          <p:cNvPr id="3" name="Notes Placeholder 2"/>
+          <p:cNvSpPr>
+            <a:spLocks noGrp="1"/>
+          </p:cNvSpPr>
+          <p:nvPr>
+            <p:ph type="body" idx="1"/>
+          </p:nvPr>
+        </p:nvSpPr>
+        <p:spPr/>
+        <p:txBody>
+          <a:bodyPr/>
+          <a:lstStyle/>
+          <a:p>
+            <a:r>
+              <a:rPr lang="en-US" dirty="0"/>
+              <a:t>Test statistic: calculated from the data and compared to a reference distribution</a:t>
+            </a:r>
+          </a:p>
+          <a:p>
+            <a:endParaRPr lang="en-US" dirty="0"/>
+          </a:p>
+          <a:p>
+            <a:r>
+              <a:rPr lang="en-US" dirty="0"/>
+              <a:t>Spatial weights: 1) formal expression of locational similarity</a:t>
+            </a:r>
+          </a:p>
+          <a:p>
+            <a:r>
+              <a:rPr lang="en-US" dirty="0"/>
+              <a:t>2) Spatial autocorrelation is about interaction</a:t>
+            </a:r>
+          </a:p>
+          <a:p>
+            <a:r>
+              <a:rPr lang="en-US" dirty="0"/>
+              <a:t>3) Meant to constrain the number of neighbors (</a:t>
+            </a:r>
+            <a:r>
+              <a:rPr lang="en-US" dirty="0" err="1"/>
+              <a:t>ie</a:t>
+            </a:r>
+            <a:r>
+              <a:rPr lang="en-US" dirty="0"/>
+              <a:t> only those that share a border)</a:t>
+            </a:r>
+          </a:p>
+        </p:txBody>
+      </p:sp>
+      <p:sp>
+        <p:nvSpPr>
+          <p:cNvPr id="4" name="Slide Number Placeholder 3"/>
+          <p:cNvSpPr>
+            <a:spLocks noGrp="1"/>
+          </p:cNvSpPr>
+          <p:nvPr>
+            <p:ph type="sldNum" sz="quarter" idx="5"/>
+          </p:nvPr>
+        </p:nvSpPr>
+        <p:spPr/>
+        <p:txBody>
+          <a:bodyPr/>
+          <a:lstStyle/>
+          <a:p>
+            <a:fld id="{8B0993E8-77CB-4CE8-8134-9D98A3510F3A}" type="slidenum">
+              <a:rPr lang="en-US" smtClean="0"/>
+              <a:t>5</a:t>
+            </a:fld>
+            <a:endParaRPr lang="en-US" dirty="0"/>
+          </a:p>
+        </p:txBody>
+      </p:sp>
+    </p:spTree>
+    <p:extLst>
+      <p:ext uri="{BB962C8B-B14F-4D97-AF65-F5344CB8AC3E}">
+        <p14:creationId xmlns:p14="http://schemas.microsoft.com/office/powerpoint/2010/main" val="2548510761"/>
       </p:ext>
     </p:extLst>
   </p:cSld>
@@ -3167,6 +3379,155 @@
 </p:sld>
 </file>
 
+<file path=ppt/slides/slide13.xml><?xml version="1.0" encoding="utf-8"?>
+<p:sld xmlns:a="http://schemas.openxmlformats.org/drawingml/2006/main" xmlns:r="http://schemas.openxmlformats.org/officeDocument/2006/relationships" xmlns:p="http://schemas.openxmlformats.org/presentationml/2006/main">
+  <p:cSld>
+    <p:spTree>
+      <p:nvGrpSpPr>
+        <p:cNvPr id="1" name=""/>
+        <p:cNvGrpSpPr/>
+        <p:nvPr/>
+      </p:nvGrpSpPr>
+      <p:grpSpPr>
+        <a:xfrm>
+          <a:off x="0" y="0"/>
+          <a:ext cx="0" cy="0"/>
+          <a:chOff x="0" y="0"/>
+          <a:chExt cx="0" cy="0"/>
+        </a:xfrm>
+      </p:grpSpPr>
+      <p:sp>
+        <p:nvSpPr>
+          <p:cNvPr id="2" name="Title 1">
+            <a:extLst>
+              <a:ext uri="{FF2B5EF4-FFF2-40B4-BE49-F238E27FC236}">
+                <a16:creationId xmlns:a16="http://schemas.microsoft.com/office/drawing/2014/main" id="{614A2DDD-2A87-FB4C-916B-D4F3D2EE518F}"/>
+              </a:ext>
+            </a:extLst>
+          </p:cNvPr>
+          <p:cNvSpPr>
+            <a:spLocks noGrp="1"/>
+          </p:cNvSpPr>
+          <p:nvPr>
+            <p:ph type="title"/>
+          </p:nvPr>
+        </p:nvSpPr>
+        <p:spPr/>
+        <p:txBody>
+          <a:bodyPr/>
+          <a:lstStyle/>
+          <a:p>
+            <a:r>
+              <a:rPr lang="en-US" dirty="0"/>
+              <a:t>Reasonings for SAC</a:t>
+            </a:r>
+          </a:p>
+        </p:txBody>
+      </p:sp>
+      <p:sp>
+        <p:nvSpPr>
+          <p:cNvPr id="3" name="Text Placeholder 2">
+            <a:extLst>
+              <a:ext uri="{FF2B5EF4-FFF2-40B4-BE49-F238E27FC236}">
+                <a16:creationId xmlns:a16="http://schemas.microsoft.com/office/drawing/2014/main" id="{F7E2DA19-9AC3-2346-A70D-FB7B1FF59E2D}"/>
+              </a:ext>
+            </a:extLst>
+          </p:cNvPr>
+          <p:cNvSpPr>
+            <a:spLocks noGrp="1"/>
+          </p:cNvSpPr>
+          <p:nvPr>
+            <p:ph type="body" sz="quarter" idx="10"/>
+          </p:nvPr>
+        </p:nvSpPr>
+        <p:spPr/>
+        <p:txBody>
+          <a:bodyPr/>
+          <a:lstStyle/>
+          <a:p>
+            <a:r>
+              <a:rPr lang="en-US" dirty="0"/>
+              <a:t>1. Spatial Autocorrelation</a:t>
+            </a:r>
+          </a:p>
+          <a:p>
+            <a:endParaRPr lang="en-US" dirty="0"/>
+          </a:p>
+        </p:txBody>
+      </p:sp>
+      <p:sp>
+        <p:nvSpPr>
+          <p:cNvPr id="5" name="Text Placeholder 3">
+            <a:extLst>
+              <a:ext uri="{FF2B5EF4-FFF2-40B4-BE49-F238E27FC236}">
+                <a16:creationId xmlns:a16="http://schemas.microsoft.com/office/drawing/2014/main" id="{EA9E51CB-C4FE-D540-8E63-ECEAA6B24738}"/>
+              </a:ext>
+            </a:extLst>
+          </p:cNvPr>
+          <p:cNvSpPr>
+            <a:spLocks noGrp="1"/>
+          </p:cNvSpPr>
+          <p:nvPr>
+            <p:ph type="body" sz="quarter" idx="11"/>
+          </p:nvPr>
+        </p:nvSpPr>
+        <p:spPr>
+          <a:xfrm>
+            <a:off x="690680" y="1355611"/>
+            <a:ext cx="7509942" cy="2288381"/>
+          </a:xfrm>
+        </p:spPr>
+        <p:txBody>
+          <a:bodyPr/>
+          <a:lstStyle/>
+          <a:p>
+            <a:r>
+              <a:rPr lang="en-US" sz="1600" dirty="0"/>
+              <a:t>Why should I care about spatial autocorrelation?</a:t>
+            </a:r>
+          </a:p>
+          <a:p>
+            <a:pPr marL="285750" indent="-285750">
+              <a:buFont typeface="Arial" panose="020B0604020202020204" pitchFamily="34" charset="0"/>
+              <a:buChar char="•"/>
+            </a:pPr>
+            <a:r>
+              <a:rPr lang="en-US" sz="1600" dirty="0"/>
+              <a:t>Spatial data is usually locationally dependent.  This can result in a dataset appearing to have correlations which may be due to their inherent locational dependence, rather than the correlations of other non-related variables.</a:t>
+            </a:r>
+          </a:p>
+          <a:p>
+            <a:pPr marL="285750" indent="-285750">
+              <a:buFont typeface="Arial" panose="020B0604020202020204" pitchFamily="34" charset="0"/>
+              <a:buChar char="•"/>
+            </a:pPr>
+            <a:endParaRPr lang="en-US" sz="1600" dirty="0"/>
+          </a:p>
+          <a:p>
+            <a:pPr marL="285750" indent="-285750">
+              <a:buFont typeface="Arial" panose="020B0604020202020204" pitchFamily="34" charset="0"/>
+              <a:buChar char="•"/>
+            </a:pPr>
+            <a:r>
+              <a:rPr lang="en-US" sz="1600" dirty="0"/>
+              <a:t>Its good to have a sense of how spatially autocorrelated a dataset may be, when you are applying other spatial analysis techniques</a:t>
+            </a:r>
+          </a:p>
+        </p:txBody>
+      </p:sp>
+    </p:spTree>
+    <p:extLst>
+      <p:ext uri="{BB962C8B-B14F-4D97-AF65-F5344CB8AC3E}">
+        <p14:creationId xmlns:p14="http://schemas.microsoft.com/office/powerpoint/2010/main" val="1305736529"/>
+      </p:ext>
+    </p:extLst>
+  </p:cSld>
+  <p:clrMapOvr>
+    <a:masterClrMapping/>
+  </p:clrMapOvr>
+</p:sld>
+</file>
+
 <file path=ppt/slides/slide2.xml><?xml version="1.0" encoding="utf-8"?>
 <p:sld xmlns:a="http://schemas.openxmlformats.org/drawingml/2006/main" xmlns:r="http://schemas.openxmlformats.org/officeDocument/2006/relationships" xmlns:p="http://schemas.openxmlformats.org/presentationml/2006/main">
   <p:cSld>
@@ -3332,6 +3693,156 @@
           <p:cNvPr id="2" name="Title 1">
             <a:extLst>
               <a:ext uri="{FF2B5EF4-FFF2-40B4-BE49-F238E27FC236}">
+                <a16:creationId xmlns:a16="http://schemas.microsoft.com/office/drawing/2014/main" id="{D17A9207-D30F-E040-AA6F-3C39681C7ACA}"/>
+              </a:ext>
+            </a:extLst>
+          </p:cNvPr>
+          <p:cNvSpPr>
+            <a:spLocks noGrp="1"/>
+          </p:cNvSpPr>
+          <p:nvPr>
+            <p:ph type="title"/>
+          </p:nvPr>
+        </p:nvSpPr>
+        <p:spPr/>
+        <p:txBody>
+          <a:bodyPr/>
+          <a:lstStyle/>
+          <a:p>
+            <a:r>
+              <a:rPr lang="en-US" dirty="0"/>
+              <a:t>Spatial randomness</a:t>
+            </a:r>
+          </a:p>
+        </p:txBody>
+      </p:sp>
+      <p:sp>
+        <p:nvSpPr>
+          <p:cNvPr id="3" name="Text Placeholder 2">
+            <a:extLst>
+              <a:ext uri="{FF2B5EF4-FFF2-40B4-BE49-F238E27FC236}">
+                <a16:creationId xmlns:a16="http://schemas.microsoft.com/office/drawing/2014/main" id="{E8EAD9D7-6BE0-BA46-85E0-D7029C317EE1}"/>
+              </a:ext>
+            </a:extLst>
+          </p:cNvPr>
+          <p:cNvSpPr>
+            <a:spLocks noGrp="1"/>
+          </p:cNvSpPr>
+          <p:nvPr>
+            <p:ph type="body" sz="quarter" idx="10"/>
+          </p:nvPr>
+        </p:nvSpPr>
+        <p:spPr/>
+        <p:txBody>
+          <a:bodyPr/>
+          <a:lstStyle/>
+          <a:p>
+            <a:r>
+              <a:rPr lang="en-US" dirty="0"/>
+              <a:t>1. Advanced Geospatial Analysis</a:t>
+            </a:r>
+          </a:p>
+          <a:p>
+            <a:endParaRPr lang="en-US" dirty="0"/>
+          </a:p>
+        </p:txBody>
+      </p:sp>
+      <p:sp>
+        <p:nvSpPr>
+          <p:cNvPr id="4" name="Text Placeholder 3">
+            <a:extLst>
+              <a:ext uri="{FF2B5EF4-FFF2-40B4-BE49-F238E27FC236}">
+                <a16:creationId xmlns:a16="http://schemas.microsoft.com/office/drawing/2014/main" id="{9AFA0817-0131-A942-A1C8-84831B39DF19}"/>
+              </a:ext>
+            </a:extLst>
+          </p:cNvPr>
+          <p:cNvSpPr>
+            <a:spLocks noGrp="1"/>
+          </p:cNvSpPr>
+          <p:nvPr>
+            <p:ph type="body" sz="quarter" idx="11"/>
+          </p:nvPr>
+        </p:nvSpPr>
+        <p:spPr>
+          <a:xfrm>
+            <a:off x="374493" y="1339135"/>
+            <a:ext cx="8378618" cy="2288381"/>
+          </a:xfrm>
+        </p:spPr>
+        <p:txBody>
+          <a:bodyPr/>
+          <a:lstStyle/>
+          <a:p>
+            <a:pPr marL="285750" indent="-285750">
+              <a:buFont typeface="Arial" panose="020B0604020202020204" pitchFamily="34" charset="0"/>
+              <a:buChar char="•"/>
+            </a:pPr>
+            <a:r>
+              <a:rPr lang="en-US" b="1" dirty="0"/>
+              <a:t>Spatial randomness </a:t>
+            </a:r>
+            <a:r>
+              <a:rPr lang="en-US" dirty="0"/>
+              <a:t>– no pattern</a:t>
+            </a:r>
+          </a:p>
+          <a:p>
+            <a:pPr marL="285750" indent="-285750">
+              <a:buFont typeface="Arial" panose="020B0604020202020204" pitchFamily="34" charset="0"/>
+              <a:buChar char="•"/>
+            </a:pPr>
+            <a:r>
+              <a:rPr lang="en-US" dirty="0"/>
+              <a:t>If spatial randomness is rejected, then there is a spatial structure</a:t>
+            </a:r>
+          </a:p>
+          <a:p>
+            <a:pPr marL="285750" indent="-285750">
+              <a:buFont typeface="Arial" panose="020B0604020202020204" pitchFamily="34" charset="0"/>
+              <a:buChar char="•"/>
+            </a:pPr>
+            <a:r>
+              <a:rPr lang="en-US" dirty="0"/>
+              <a:t>Value at one location does not depend on values at other neighboring locations</a:t>
+            </a:r>
+          </a:p>
+        </p:txBody>
+      </p:sp>
+    </p:spTree>
+    <p:extLst>
+      <p:ext uri="{BB962C8B-B14F-4D97-AF65-F5344CB8AC3E}">
+        <p14:creationId xmlns:p14="http://schemas.microsoft.com/office/powerpoint/2010/main" val="1220162749"/>
+      </p:ext>
+    </p:extLst>
+  </p:cSld>
+  <p:clrMapOvr>
+    <a:masterClrMapping/>
+  </p:clrMapOvr>
+</p:sld>
+</file>
+
+<file path=ppt/slides/slide4.xml><?xml version="1.0" encoding="utf-8"?>
+<p:sld xmlns:a="http://schemas.openxmlformats.org/drawingml/2006/main" xmlns:r="http://schemas.openxmlformats.org/officeDocument/2006/relationships" xmlns:p="http://schemas.openxmlformats.org/presentationml/2006/main">
+  <p:cSld>
+    <p:spTree>
+      <p:nvGrpSpPr>
+        <p:cNvPr id="1" name=""/>
+        <p:cNvGrpSpPr/>
+        <p:nvPr/>
+      </p:nvGrpSpPr>
+      <p:grpSpPr>
+        <a:xfrm>
+          <a:off x="0" y="0"/>
+          <a:ext cx="0" cy="0"/>
+          <a:chOff x="0" y="0"/>
+          <a:chExt cx="0" cy="0"/>
+        </a:xfrm>
+      </p:grpSpPr>
+      <p:sp>
+        <p:nvSpPr>
+          <p:cNvPr id="2" name="Title 1">
+            <a:extLst>
+              <a:ext uri="{FF2B5EF4-FFF2-40B4-BE49-F238E27FC236}">
                 <a16:creationId xmlns:a16="http://schemas.microsoft.com/office/drawing/2014/main" id="{53C17DB7-ABE2-9249-BA6F-B38EAAF38A07}"/>
               </a:ext>
             </a:extLst>
@@ -3401,7 +3912,7 @@
           <p:nvPr/>
         </p:nvPicPr>
         <p:blipFill>
-          <a:blip r:embed="rId2">
+          <a:blip r:embed="rId3">
             <a:extLst>
               <a:ext uri="{28A0092B-C50C-407E-A947-70E740481C1C}">
                 <a14:useLocalDpi xmlns:a14="http://schemas.microsoft.com/office/drawing/2010/main" val="0"/>
@@ -3447,8 +3958,8 @@
         </p:nvSpPr>
         <p:spPr>
           <a:xfrm>
-            <a:off x="481991" y="1306842"/>
-            <a:ext cx="3561017" cy="1384995"/>
+            <a:off x="585987" y="1245287"/>
+            <a:ext cx="3859664" cy="2893100"/>
           </a:xfrm>
           <a:prstGeom prst="rect">
             <a:avLst/>
@@ -3528,231 +4039,69 @@
               <a:t>Cliff and Ord 1973, 1981</a:t>
             </a:r>
           </a:p>
+          <a:p>
+            <a:endParaRPr lang="en-US" dirty="0"/>
+          </a:p>
+          <a:p>
+            <a:r>
+              <a:rPr lang="en-US" b="1" i="1" dirty="0"/>
+              <a:t>Random </a:t>
+            </a:r>
+            <a:r>
+              <a:rPr lang="en-US" b="1" dirty="0"/>
+              <a:t>– no autocorrelation – </a:t>
+            </a:r>
+            <a:r>
+              <a:rPr lang="en-US" b="1" u="sng" dirty="0"/>
+              <a:t>Null Hypothesis</a:t>
+            </a:r>
+          </a:p>
+          <a:p>
+            <a:r>
+              <a:rPr lang="en-US" b="1" dirty="0"/>
+              <a:t>If Null is rejected, the alternative hypotheses are:</a:t>
+            </a:r>
+          </a:p>
+          <a:p>
+            <a:endParaRPr lang="en-US" b="1" dirty="0"/>
+          </a:p>
+          <a:p>
+            <a:r>
+              <a:rPr lang="en-US" b="1" i="1" dirty="0"/>
+              <a:t>Clustered</a:t>
+            </a:r>
+            <a:r>
+              <a:rPr lang="en-US" b="1" dirty="0"/>
+              <a:t> – above zero   </a:t>
+            </a:r>
+            <a:r>
+              <a:rPr lang="en-US" b="1" u="sng" dirty="0"/>
+              <a:t>Alternative Hypothesis</a:t>
+            </a:r>
+          </a:p>
+          <a:p>
+            <a:r>
+              <a:rPr lang="en-US" b="1" i="1" dirty="0"/>
+              <a:t>Dispersed</a:t>
+            </a:r>
+            <a:r>
+              <a:rPr lang="en-US" b="1" dirty="0"/>
+              <a:t> – below zero  </a:t>
+            </a:r>
+            <a:r>
+              <a:rPr lang="en-US" b="1" u="sng" dirty="0"/>
+              <a:t>Alternative Hypothesis</a:t>
+            </a:r>
+          </a:p>
+          <a:p>
+            <a:endParaRPr lang="en-US" b="1" dirty="0"/>
+          </a:p>
         </p:txBody>
       </p:sp>
     </p:spTree>
     <p:extLst>
       <p:ext uri="{BB962C8B-B14F-4D97-AF65-F5344CB8AC3E}">
         <p14:creationId xmlns:p14="http://schemas.microsoft.com/office/powerpoint/2010/main" val="1660657921"/>
-      </p:ext>
-    </p:extLst>
-  </p:cSld>
-  <p:clrMapOvr>
-    <a:masterClrMapping/>
-  </p:clrMapOvr>
-</p:sld>
-</file>
-
-<file path=ppt/slides/slide4.xml><?xml version="1.0" encoding="utf-8"?>
-<p:sld xmlns:a="http://schemas.openxmlformats.org/drawingml/2006/main" xmlns:r="http://schemas.openxmlformats.org/officeDocument/2006/relationships" xmlns:p="http://schemas.openxmlformats.org/presentationml/2006/main">
-  <p:cSld>
-    <p:spTree>
-      <p:nvGrpSpPr>
-        <p:cNvPr id="1" name=""/>
-        <p:cNvGrpSpPr/>
-        <p:nvPr/>
-      </p:nvGrpSpPr>
-      <p:grpSpPr>
-        <a:xfrm>
-          <a:off x="0" y="0"/>
-          <a:ext cx="0" cy="0"/>
-          <a:chOff x="0" y="0"/>
-          <a:chExt cx="0" cy="0"/>
-        </a:xfrm>
-      </p:grpSpPr>
-      <p:sp>
-        <p:nvSpPr>
-          <p:cNvPr id="2" name="Title 1">
-            <a:extLst>
-              <a:ext uri="{FF2B5EF4-FFF2-40B4-BE49-F238E27FC236}">
-                <a16:creationId xmlns:a16="http://schemas.microsoft.com/office/drawing/2014/main" id="{53C17DB7-ABE2-9249-BA6F-B38EAAF38A07}"/>
-              </a:ext>
-            </a:extLst>
-          </p:cNvPr>
-          <p:cNvSpPr>
-            <a:spLocks noGrp="1"/>
-          </p:cNvSpPr>
-          <p:nvPr>
-            <p:ph type="title"/>
-          </p:nvPr>
-        </p:nvSpPr>
-        <p:spPr/>
-        <p:txBody>
-          <a:bodyPr/>
-          <a:lstStyle/>
-          <a:p>
-            <a:r>
-              <a:rPr lang="en-US" dirty="0"/>
-              <a:t>Spatial Autocorrelation</a:t>
-            </a:r>
-          </a:p>
-        </p:txBody>
-      </p:sp>
-      <p:sp>
-        <p:nvSpPr>
-          <p:cNvPr id="3" name="Text Placeholder 2">
-            <a:extLst>
-              <a:ext uri="{FF2B5EF4-FFF2-40B4-BE49-F238E27FC236}">
-                <a16:creationId xmlns:a16="http://schemas.microsoft.com/office/drawing/2014/main" id="{1713683F-6D57-C742-BE5C-0343C0B83E59}"/>
-              </a:ext>
-            </a:extLst>
-          </p:cNvPr>
-          <p:cNvSpPr>
-            <a:spLocks noGrp="1"/>
-          </p:cNvSpPr>
-          <p:nvPr>
-            <p:ph type="body" sz="quarter" idx="10"/>
-          </p:nvPr>
-        </p:nvSpPr>
-        <p:spPr/>
-        <p:txBody>
-          <a:bodyPr/>
-          <a:lstStyle/>
-          <a:p>
-            <a:r>
-              <a:rPr lang="en-US" dirty="0"/>
-              <a:t>1. Spatial Autocorrelation</a:t>
-            </a:r>
-          </a:p>
-          <a:p>
-            <a:endParaRPr lang="en-US" dirty="0"/>
-          </a:p>
-        </p:txBody>
-      </p:sp>
-      <p:sp>
-        <p:nvSpPr>
-          <p:cNvPr id="6" name="Rectangle 5">
-            <a:extLst>
-              <a:ext uri="{FF2B5EF4-FFF2-40B4-BE49-F238E27FC236}">
-                <a16:creationId xmlns:a16="http://schemas.microsoft.com/office/drawing/2014/main" id="{85041C9D-1A81-1948-A3A1-3D908D6D8B6D}"/>
-              </a:ext>
-            </a:extLst>
-          </p:cNvPr>
-          <p:cNvSpPr/>
-          <p:nvPr/>
-        </p:nvSpPr>
-        <p:spPr>
-          <a:xfrm>
-            <a:off x="481991" y="1306842"/>
-            <a:ext cx="3561017" cy="1384995"/>
-          </a:xfrm>
-          <a:prstGeom prst="rect">
-            <a:avLst/>
-          </a:prstGeom>
-        </p:spPr>
-        <p:txBody>
-          <a:bodyPr wrap="square">
-            <a:spAutoFit/>
-          </a:bodyPr>
-          <a:lstStyle/>
-          <a:p>
-            <a:r>
-              <a:rPr lang="en-US" dirty="0">
-                <a:solidFill>
-                  <a:srgbClr val="222222"/>
-                </a:solidFill>
-                <a:latin typeface="arial" panose="020B0604020202020204" pitchFamily="34" charset="0"/>
-              </a:rPr>
-              <a:t>A measure of the degree to which a set of </a:t>
-            </a:r>
-            <a:r>
-              <a:rPr lang="en-US" b="1" dirty="0">
-                <a:solidFill>
-                  <a:srgbClr val="222222"/>
-                </a:solidFill>
-                <a:latin typeface="arial" panose="020B0604020202020204" pitchFamily="34" charset="0"/>
-              </a:rPr>
-              <a:t>spatial</a:t>
-            </a:r>
-            <a:r>
-              <a:rPr lang="en-US" dirty="0">
-                <a:solidFill>
-                  <a:srgbClr val="222222"/>
-                </a:solidFill>
-                <a:latin typeface="arial" panose="020B0604020202020204" pitchFamily="34" charset="0"/>
-              </a:rPr>
-              <a:t> features and their associated data values tend to be clustered together in space (positive </a:t>
-            </a:r>
-            <a:r>
-              <a:rPr lang="en-US" b="1" dirty="0">
-                <a:solidFill>
-                  <a:srgbClr val="222222"/>
-                </a:solidFill>
-                <a:latin typeface="arial" panose="020B0604020202020204" pitchFamily="34" charset="0"/>
-              </a:rPr>
-              <a:t>spatial autocorrelation</a:t>
-            </a:r>
-            <a:r>
-              <a:rPr lang="en-US" dirty="0">
-                <a:solidFill>
-                  <a:srgbClr val="222222"/>
-                </a:solidFill>
-                <a:latin typeface="arial" panose="020B0604020202020204" pitchFamily="34" charset="0"/>
-              </a:rPr>
-              <a:t>) or dispersed (negative </a:t>
-            </a:r>
-            <a:r>
-              <a:rPr lang="en-US" b="1" dirty="0">
-                <a:solidFill>
-                  <a:srgbClr val="222222"/>
-                </a:solidFill>
-                <a:latin typeface="arial" panose="020B0604020202020204" pitchFamily="34" charset="0"/>
-              </a:rPr>
-              <a:t>spatial autocorrelation</a:t>
-            </a:r>
-            <a:r>
-              <a:rPr lang="en-US" dirty="0">
-                <a:solidFill>
-                  <a:srgbClr val="222222"/>
-                </a:solidFill>
-                <a:latin typeface="arial" panose="020B0604020202020204" pitchFamily="34" charset="0"/>
-              </a:rPr>
-              <a:t>).</a:t>
-            </a:r>
-            <a:endParaRPr lang="en-US" dirty="0"/>
-          </a:p>
-        </p:txBody>
-      </p:sp>
-      <p:pic>
-        <p:nvPicPr>
-          <p:cNvPr id="7" name="Picture 6">
-            <a:extLst>
-              <a:ext uri="{FF2B5EF4-FFF2-40B4-BE49-F238E27FC236}">
-                <a16:creationId xmlns:a16="http://schemas.microsoft.com/office/drawing/2014/main" id="{AF71B131-8F6D-EF45-BACE-43D1958E9C91}"/>
-              </a:ext>
-            </a:extLst>
-          </p:cNvPr>
-          <p:cNvPicPr>
-            <a:picLocks noChangeAspect="1"/>
-          </p:cNvPicPr>
-          <p:nvPr/>
-        </p:nvPicPr>
-        <p:blipFill>
-          <a:blip r:embed="rId2" cstate="print">
-            <a:extLst>
-              <a:ext uri="{28A0092B-C50C-407E-A947-70E740481C1C}">
-                <a14:useLocalDpi xmlns:a14="http://schemas.microsoft.com/office/drawing/2010/main" val="0"/>
-              </a:ext>
-            </a:extLst>
-          </a:blip>
-          <a:stretch>
-            <a:fillRect/>
-          </a:stretch>
-        </p:blipFill>
-        <p:spPr>
-          <a:xfrm>
-            <a:off x="4424387" y="999344"/>
-            <a:ext cx="4531539" cy="2931905"/>
-          </a:xfrm>
-          <a:prstGeom prst="rect">
-            <a:avLst/>
-          </a:prstGeom>
-        </p:spPr>
-      </p:pic>
-    </p:spTree>
-    <p:extLst>
-      <p:ext uri="{BB962C8B-B14F-4D97-AF65-F5344CB8AC3E}">
-        <p14:creationId xmlns:p14="http://schemas.microsoft.com/office/powerpoint/2010/main" val="78627211"/>
       </p:ext>
     </p:extLst>
   </p:cSld>
@@ -3784,7 +4133,7 @@
           <p:cNvPr id="2" name="Title 1">
             <a:extLst>
               <a:ext uri="{FF2B5EF4-FFF2-40B4-BE49-F238E27FC236}">
-                <a16:creationId xmlns:a16="http://schemas.microsoft.com/office/drawing/2014/main" id="{614A2DDD-2A87-FB4C-916B-D4F3D2EE518F}"/>
+                <a16:creationId xmlns:a16="http://schemas.microsoft.com/office/drawing/2014/main" id="{70180382-5909-944F-A379-13F1D2C9BA18}"/>
               </a:ext>
             </a:extLst>
           </p:cNvPr>
@@ -3802,7 +4151,7 @@
           <a:p>
             <a:r>
               <a:rPr lang="en-US" dirty="0"/>
-              <a:t>Reasonings for SAC</a:t>
+              <a:t>Quantifying SAC</a:t>
             </a:r>
           </a:p>
         </p:txBody>
@@ -3812,7 +4161,7 @@
           <p:cNvPr id="3" name="Text Placeholder 2">
             <a:extLst>
               <a:ext uri="{FF2B5EF4-FFF2-40B4-BE49-F238E27FC236}">
-                <a16:creationId xmlns:a16="http://schemas.microsoft.com/office/drawing/2014/main" id="{F7E2DA19-9AC3-2346-A70D-FB7B1FF59E2D}"/>
+                <a16:creationId xmlns:a16="http://schemas.microsoft.com/office/drawing/2014/main" id="{D30D2B5C-5A3B-8E4B-B1B5-6023F37A2032}"/>
               </a:ext>
             </a:extLst>
           </p:cNvPr>
@@ -3840,10 +4189,10 @@
       </p:sp>
       <p:sp>
         <p:nvSpPr>
-          <p:cNvPr id="5" name="Text Placeholder 3">
+          <p:cNvPr id="4" name="Text Placeholder 3">
             <a:extLst>
               <a:ext uri="{FF2B5EF4-FFF2-40B4-BE49-F238E27FC236}">
-                <a16:creationId xmlns:a16="http://schemas.microsoft.com/office/drawing/2014/main" id="{EA9E51CB-C4FE-D540-8E63-ECEAA6B24738}"/>
+                <a16:creationId xmlns:a16="http://schemas.microsoft.com/office/drawing/2014/main" id="{3B227320-7AF5-CC46-8C79-217C804FE5E0}"/>
               </a:ext>
             </a:extLst>
           </p:cNvPr>
@@ -3856,27 +4205,21 @@
         </p:nvSpPr>
         <p:spPr>
           <a:xfrm>
-            <a:off x="690680" y="1355611"/>
-            <a:ext cx="7509942" cy="2288381"/>
+            <a:off x="374493" y="1339135"/>
+            <a:ext cx="6507938" cy="2288381"/>
           </a:xfrm>
         </p:spPr>
         <p:txBody>
           <a:bodyPr/>
           <a:lstStyle/>
-          <a:p>
-            <a:r>
-              <a:rPr lang="en-US" sz="1600" dirty="0"/>
-              <a:t>Why should I care about spatial autocorrelation?</a:t>
-            </a:r>
-          </a:p>
           <a:p>
             <a:pPr marL="285750" indent="-285750">
               <a:buFont typeface="Arial" panose="020B0604020202020204" pitchFamily="34" charset="0"/>
               <a:buChar char="•"/>
             </a:pPr>
             <a:r>
-              <a:rPr lang="en-US" sz="1600" dirty="0"/>
-              <a:t>Spatial data is usually locationally dependent.  This can result in a dataset appearing to have correlations which may be due to their inherent locational dependence, rather than the correlations of other non-related variables.</a:t>
+              <a:rPr lang="en-US" dirty="0"/>
+              <a:t>Statistical testing (using a test statistic)</a:t>
             </a:r>
           </a:p>
           <a:p>
@@ -3884,7 +4227,10 @@
               <a:buFont typeface="Arial" panose="020B0604020202020204" pitchFamily="34" charset="0"/>
               <a:buChar char="•"/>
             </a:pPr>
-            <a:endParaRPr lang="en-US" sz="1600" dirty="0"/>
+            <a:r>
+              <a:rPr lang="en-US" dirty="0"/>
+              <a:t>How likely is the test statistic value if it had occurred under the null hypothesis (spatial randomness)</a:t>
+            </a:r>
           </a:p>
           <a:p>
             <a:pPr marL="285750" indent="-285750">
@@ -3892,8 +4238,345 @@
               <a:buChar char="•"/>
             </a:pPr>
             <a:r>
-              <a:rPr lang="en-US" sz="1600" dirty="0"/>
-              <a:t>Its good to have a sense of how spatially autocorrelated a dataset may be, when you are applying other spatial analysis techniques</a:t>
+              <a:rPr lang="en-US" dirty="0"/>
+              <a:t>When unlikely – the null is rejected (low p value)</a:t>
+            </a:r>
+          </a:p>
+          <a:p>
+            <a:pPr marL="285750" indent="-285750">
+              <a:buFont typeface="Arial" panose="020B0604020202020204" pitchFamily="34" charset="0"/>
+              <a:buChar char="•"/>
+            </a:pPr>
+            <a:r>
+              <a:rPr lang="en-US" dirty="0"/>
+              <a:t>For SAC – we are most interested in capturing/combining</a:t>
+            </a:r>
+          </a:p>
+          <a:p>
+            <a:pPr marL="662940" lvl="1" indent="-285750">
+              <a:buFont typeface="Arial" panose="020B0604020202020204" pitchFamily="34" charset="0"/>
+              <a:buChar char="•"/>
+            </a:pPr>
+            <a:r>
+              <a:rPr lang="en-US" b="1" dirty="0"/>
+              <a:t>Attribute similarity – </a:t>
+            </a:r>
+            <a:r>
+              <a:rPr lang="en-US" dirty="0"/>
+              <a:t>summary of similarity/dissimilarity of observations of a variable at differing locations    f(x</a:t>
+            </a:r>
+            <a:r>
+              <a:rPr lang="en-US" baseline="-25000" dirty="0"/>
+              <a:t>i</a:t>
+            </a:r>
+            <a:r>
+              <a:rPr lang="en-US" dirty="0"/>
+              <a:t>, </a:t>
+            </a:r>
+            <a:r>
+              <a:rPr lang="en-US" dirty="0" err="1"/>
+              <a:t>x</a:t>
+            </a:r>
+            <a:r>
+              <a:rPr lang="en-US" baseline="-25000" dirty="0" err="1"/>
+              <a:t>j</a:t>
+            </a:r>
+            <a:r>
+              <a:rPr lang="en-US" dirty="0"/>
+              <a:t>)</a:t>
+            </a:r>
+          </a:p>
+          <a:p>
+            <a:pPr marL="662940" lvl="1" indent="-285750">
+              <a:buFont typeface="Arial" panose="020B0604020202020204" pitchFamily="34" charset="0"/>
+              <a:buChar char="•"/>
+            </a:pPr>
+            <a:r>
+              <a:rPr lang="en-US" b="1" dirty="0"/>
+              <a:t>Locational similarity – </a:t>
+            </a:r>
+            <a:r>
+              <a:rPr lang="en-US" dirty="0"/>
+              <a:t>formalizing the notion of neighbors.  Construction of spatial weights </a:t>
+            </a:r>
+            <a:r>
+              <a:rPr lang="en-US" dirty="0" err="1"/>
+              <a:t>w</a:t>
+            </a:r>
+            <a:r>
+              <a:rPr lang="en-US" baseline="-25000" dirty="0" err="1"/>
+              <a:t>ij</a:t>
+            </a:r>
+            <a:endParaRPr lang="en-US" baseline="-25000" dirty="0"/>
+          </a:p>
+        </p:txBody>
+      </p:sp>
+      <mc:AlternateContent xmlns:mc="http://schemas.openxmlformats.org/markup-compatibility/2006">
+        <mc:Choice xmlns:a14="http://schemas.microsoft.com/office/drawing/2010/main" Requires="a14">
+          <p:sp>
+            <p:nvSpPr>
+              <p:cNvPr id="6" name="TextBox 5">
+                <a:extLst>
+                  <a:ext uri="{FF2B5EF4-FFF2-40B4-BE49-F238E27FC236}">
+                    <a16:creationId xmlns:a16="http://schemas.microsoft.com/office/drawing/2014/main" id="{4EDEEBF1-38EC-174D-8FE3-6AF6FD82CC96}"/>
+                  </a:ext>
+                </a:extLst>
+              </p:cNvPr>
+              <p:cNvSpPr txBox="1">
+                <a:spLocks noChangeAspect="1"/>
+              </p:cNvSpPr>
+              <p:nvPr/>
+            </p:nvSpPr>
+            <p:spPr>
+              <a:xfrm>
+                <a:off x="6714906" y="1166722"/>
+                <a:ext cx="2294279" cy="521681"/>
+              </a:xfrm>
+              <a:prstGeom prst="rect">
+                <a:avLst/>
+              </a:prstGeom>
+            </p:spPr>
+            <p:txBody>
+              <a:bodyPr wrap="square" lIns="0" tIns="0" rIns="0" bIns="0" rtlCol="0">
+                <a:spAutoFit/>
+              </a:bodyPr>
+              <a:lstStyle/>
+              <a:p>
+                <a14:m>
+                  <m:oMathPara xmlns:m="http://schemas.openxmlformats.org/officeDocument/2006/math">
+                    <m:oMathParaPr>
+                      <m:jc m:val="centerGroup"/>
+                    </m:oMathParaPr>
+                    <m:oMath xmlns:m="http://schemas.openxmlformats.org/officeDocument/2006/math">
+                      <m:nary>
+                        <m:naryPr>
+                          <m:chr m:val="∑"/>
+                          <m:subHide m:val="on"/>
+                          <m:supHide m:val="on"/>
+                          <m:ctrlPr>
+                            <a:rPr lang="en-US" i="1" smtClean="0">
+                              <a:latin typeface="Cambria Math" panose="02040503050406030204" pitchFamily="18" charset="0"/>
+                            </a:rPr>
+                          </m:ctrlPr>
+                        </m:naryPr>
+                        <m:sub/>
+                        <m:sup/>
+                        <m:e>
+                          <m:r>
+                            <a:rPr lang="en-US" b="0" i="1" baseline="-25000" smtClean="0">
+                              <a:latin typeface="Cambria Math" panose="02040503050406030204" pitchFamily="18" charset="0"/>
+                            </a:rPr>
+                            <m:t>𝑖𝑗</m:t>
+                          </m:r>
+                          <m:r>
+                            <a:rPr lang="en-US" b="0" i="1" smtClean="0">
+                              <a:latin typeface="Cambria Math" panose="02040503050406030204" pitchFamily="18" charset="0"/>
+                            </a:rPr>
+                            <m:t> </m:t>
+                          </m:r>
+                          <m:r>
+                            <a:rPr lang="en-US" b="0" i="1" smtClean="0">
+                              <a:latin typeface="Cambria Math" panose="02040503050406030204" pitchFamily="18" charset="0"/>
+                            </a:rPr>
+                            <m:t>𝑓</m:t>
+                          </m:r>
+                          <m:d>
+                            <m:dPr>
+                              <m:ctrlPr>
+                                <a:rPr lang="en-US" b="0" i="1" smtClean="0">
+                                  <a:latin typeface="Cambria Math" panose="02040503050406030204" pitchFamily="18" charset="0"/>
+                                </a:rPr>
+                              </m:ctrlPr>
+                            </m:dPr>
+                            <m:e>
+                              <m:r>
+                                <a:rPr lang="en-US" b="0" i="1" smtClean="0">
+                                  <a:latin typeface="Cambria Math" panose="02040503050406030204" pitchFamily="18" charset="0"/>
+                                </a:rPr>
+                                <m:t>𝑥</m:t>
+                              </m:r>
+                              <m:r>
+                                <a:rPr lang="en-US" b="0" i="1" baseline="-25000" smtClean="0">
+                                  <a:latin typeface="Cambria Math" panose="02040503050406030204" pitchFamily="18" charset="0"/>
+                                </a:rPr>
+                                <m:t>𝑖</m:t>
+                              </m:r>
+                              <m:r>
+                                <a:rPr lang="en-US" b="0" i="1" smtClean="0">
+                                  <a:latin typeface="Cambria Math" panose="02040503050406030204" pitchFamily="18" charset="0"/>
+                                </a:rPr>
+                                <m:t> </m:t>
+                              </m:r>
+                              <m:r>
+                                <a:rPr lang="en-US" b="0" i="1" smtClean="0">
+                                  <a:latin typeface="Cambria Math" panose="02040503050406030204" pitchFamily="18" charset="0"/>
+                                </a:rPr>
+                                <m:t>𝑥𝑗</m:t>
+                              </m:r>
+                            </m:e>
+                          </m:d>
+                          <m:r>
+                            <a:rPr lang="en-US" b="0" i="1" smtClean="0">
+                              <a:latin typeface="Cambria Math" panose="02040503050406030204" pitchFamily="18" charset="0"/>
+                            </a:rPr>
+                            <m:t>  </m:t>
+                          </m:r>
+                          <m:r>
+                            <a:rPr lang="en-US" b="0" i="1" smtClean="0">
+                              <a:latin typeface="Cambria Math" panose="02040503050406030204" pitchFamily="18" charset="0"/>
+                            </a:rPr>
+                            <m:t>𝑤𝑖𝑗</m:t>
+                          </m:r>
+                        </m:e>
+                      </m:nary>
+                    </m:oMath>
+                  </m:oMathPara>
+                </a14:m>
+                <a:endParaRPr lang="en-US" dirty="0"/>
+              </a:p>
+            </p:txBody>
+          </p:sp>
+        </mc:Choice>
+        <mc:Fallback>
+          <p:sp>
+            <p:nvSpPr>
+              <p:cNvPr id="6" name="TextBox 5">
+                <a:extLst>
+                  <a:ext uri="{FF2B5EF4-FFF2-40B4-BE49-F238E27FC236}">
+                    <a16:creationId xmlns:a16="http://schemas.microsoft.com/office/drawing/2014/main" id="{4EDEEBF1-38EC-174D-8FE3-6AF6FD82CC96}"/>
+                  </a:ext>
+                </a:extLst>
+              </p:cNvPr>
+              <p:cNvSpPr txBox="1">
+                <a:spLocks noRot="1" noChangeAspect="1" noMove="1" noResize="1" noEditPoints="1" noAdjustHandles="1" noChangeArrowheads="1" noChangeShapeType="1" noTextEdit="1"/>
+              </p:cNvSpPr>
+              <p:nvPr/>
+            </p:nvSpPr>
+            <p:spPr>
+              <a:xfrm>
+                <a:off x="6714906" y="1166722"/>
+                <a:ext cx="2294279" cy="521681"/>
+              </a:xfrm>
+              <a:prstGeom prst="rect">
+                <a:avLst/>
+              </a:prstGeom>
+              <a:blipFill>
+                <a:blip r:embed="rId3"/>
+                <a:stretch>
+                  <a:fillRect l="-7143" t="-145238" b="-209524"/>
+                </a:stretch>
+              </a:blipFill>
+            </p:spPr>
+            <p:txBody>
+              <a:bodyPr/>
+              <a:lstStyle/>
+              <a:p>
+                <a:r>
+                  <a:rPr lang="en-US">
+                    <a:noFill/>
+                  </a:rPr>
+                  <a:t> </a:t>
+                </a:r>
+              </a:p>
+            </p:txBody>
+          </p:sp>
+        </mc:Fallback>
+      </mc:AlternateContent>
+      <p:sp>
+        <p:nvSpPr>
+          <p:cNvPr id="7" name="TextBox 6">
+            <a:extLst>
+              <a:ext uri="{FF2B5EF4-FFF2-40B4-BE49-F238E27FC236}">
+                <a16:creationId xmlns:a16="http://schemas.microsoft.com/office/drawing/2014/main" id="{708D646B-D865-9147-A042-CD4B07026396}"/>
+              </a:ext>
+            </a:extLst>
+          </p:cNvPr>
+          <p:cNvSpPr txBox="1"/>
+          <p:nvPr/>
+        </p:nvSpPr>
+        <p:spPr>
+          <a:xfrm>
+            <a:off x="7075091" y="1790827"/>
+            <a:ext cx="2068909" cy="1384995"/>
+          </a:xfrm>
+          <a:prstGeom prst="rect">
+            <a:avLst/>
+          </a:prstGeom>
+        </p:spPr>
+        <p:txBody>
+          <a:bodyPr wrap="square" rtlCol="0">
+            <a:spAutoFit/>
+          </a:bodyPr>
+          <a:lstStyle/>
+          <a:p>
+            <a:r>
+              <a:rPr lang="en-US" dirty="0"/>
+              <a:t>f(</a:t>
+            </a:r>
+            <a:r>
+              <a:rPr lang="en-US" dirty="0" err="1"/>
+              <a:t>x</a:t>
+            </a:r>
+            <a:r>
+              <a:rPr lang="en-US" baseline="-25000" dirty="0" err="1"/>
+              <a:t>i</a:t>
+            </a:r>
+            <a:r>
+              <a:rPr lang="en-US" dirty="0" err="1"/>
+              <a:t>x</a:t>
+            </a:r>
+            <a:r>
+              <a:rPr lang="en-US" baseline="-25000" dirty="0" err="1"/>
+              <a:t>j</a:t>
+            </a:r>
+            <a:r>
+              <a:rPr lang="en-US" dirty="0"/>
+              <a:t>) is attribute similarity between </a:t>
+            </a:r>
+            <a:r>
+              <a:rPr lang="en-US" i="1" dirty="0" err="1"/>
+              <a:t>i</a:t>
+            </a:r>
+            <a:r>
+              <a:rPr lang="en-US" dirty="0"/>
+              <a:t> and </a:t>
+            </a:r>
+            <a:r>
+              <a:rPr lang="en-US" i="1" dirty="0"/>
+              <a:t>j</a:t>
+            </a:r>
+            <a:r>
+              <a:rPr lang="en-US" dirty="0"/>
+              <a:t> for x</a:t>
+            </a:r>
+          </a:p>
+          <a:p>
+            <a:endParaRPr lang="en-US" dirty="0"/>
+          </a:p>
+          <a:p>
+            <a:r>
+              <a:rPr lang="en-US" dirty="0" err="1"/>
+              <a:t>w</a:t>
+            </a:r>
+            <a:r>
+              <a:rPr lang="en-US" baseline="-25000" dirty="0" err="1"/>
+              <a:t>ij</a:t>
+            </a:r>
+            <a:r>
+              <a:rPr lang="en-US" dirty="0"/>
+              <a:t> is spatial weight between </a:t>
+            </a:r>
+            <a:r>
+              <a:rPr lang="en-US" i="1" dirty="0" err="1"/>
+              <a:t>i</a:t>
+            </a:r>
+            <a:r>
+              <a:rPr lang="en-US" dirty="0"/>
+              <a:t> and </a:t>
+            </a:r>
+            <a:r>
+              <a:rPr lang="en-US" i="1" dirty="0"/>
+              <a:t>j</a:t>
             </a:r>
           </a:p>
         </p:txBody>
@@ -3901,7 +4584,7 @@
     </p:spTree>
     <p:extLst>
       <p:ext uri="{BB962C8B-B14F-4D97-AF65-F5344CB8AC3E}">
-        <p14:creationId xmlns:p14="http://schemas.microsoft.com/office/powerpoint/2010/main" val="1305736529"/>
+        <p14:creationId xmlns:p14="http://schemas.microsoft.com/office/powerpoint/2010/main" val="1316272142"/>
       </p:ext>
     </p:extLst>
   </p:cSld>
@@ -4005,8 +4688,8 @@
         </p:nvSpPr>
         <p:spPr>
           <a:xfrm>
-            <a:off x="1049153" y="1017478"/>
-            <a:ext cx="7344077" cy="3108543"/>
+            <a:off x="901371" y="943587"/>
+            <a:ext cx="5813465" cy="3108543"/>
           </a:xfrm>
           <a:prstGeom prst="rect">
             <a:avLst/>
@@ -4109,6 +4792,42 @@
           </a:p>
         </p:txBody>
       </p:sp>
+      <p:pic>
+        <p:nvPicPr>
+          <p:cNvPr id="6" name="Picture 5" descr="Map&#10;&#10;Description automatically generated">
+            <a:extLst>
+              <a:ext uri="{FF2B5EF4-FFF2-40B4-BE49-F238E27FC236}">
+                <a16:creationId xmlns:a16="http://schemas.microsoft.com/office/drawing/2014/main" id="{A3765DCD-4D25-F743-9441-FB9E597F9E05}"/>
+              </a:ext>
+            </a:extLst>
+          </p:cNvPr>
+          <p:cNvPicPr>
+            <a:picLocks noChangeAspect="1"/>
+          </p:cNvPicPr>
+          <p:nvPr/>
+        </p:nvPicPr>
+        <p:blipFill>
+          <a:blip r:embed="rId2">
+            <a:extLst>
+              <a:ext uri="{28A0092B-C50C-407E-A947-70E740481C1C}">
+                <a14:useLocalDpi xmlns:a14="http://schemas.microsoft.com/office/drawing/2010/main" val="0"/>
+              </a:ext>
+            </a:extLst>
+          </a:blip>
+          <a:stretch>
+            <a:fillRect/>
+          </a:stretch>
+        </p:blipFill>
+        <p:spPr>
+          <a:xfrm>
+            <a:off x="6643217" y="943586"/>
+            <a:ext cx="2286798" cy="3108543"/>
+          </a:xfrm>
+          <a:prstGeom prst="rect">
+            <a:avLst/>
+          </a:prstGeom>
+        </p:spPr>
+      </p:pic>
     </p:spTree>
     <p:extLst>
       <p:ext uri="{BB962C8B-B14F-4D97-AF65-F5344CB8AC3E}">
@@ -4582,8 +5301,8 @@
         </p:nvSpPr>
         <p:spPr>
           <a:xfrm>
-            <a:off x="413886" y="1064298"/>
-            <a:ext cx="8730114" cy="1815882"/>
+            <a:off x="539452" y="1553080"/>
+            <a:ext cx="8065095" cy="1815882"/>
           </a:xfrm>
           <a:prstGeom prst="rect">
             <a:avLst/>

</xml_diff>

<commit_message>
updated presentation Apr 27
</commit_message>
<xml_diff>
--- a/doc/BCB_Intro_Advanced_Analysis_1_2021.pptx
+++ b/doc/BCB_Intro_Advanced_Analysis_1_2021.pptx
@@ -6,7 +6,7 @@
     <p:sldMasterId id="2147483654" r:id="rId2"/>
   </p:sldMasterIdLst>
   <p:notesMasterIdLst>
-    <p:notesMasterId r:id="rId16"/>
+    <p:notesMasterId r:id="rId17"/>
   </p:notesMasterIdLst>
   <p:sldIdLst>
     <p:sldId id="335" r:id="rId3"/>
@@ -21,7 +21,8 @@
     <p:sldId id="448" r:id="rId12"/>
     <p:sldId id="449" r:id="rId13"/>
     <p:sldId id="450" r:id="rId14"/>
-    <p:sldId id="442" r:id="rId15"/>
+    <p:sldId id="454" r:id="rId15"/>
+    <p:sldId id="453" r:id="rId16"/>
   </p:sldIdLst>
   <p:sldSz cx="9144000" cy="5143500" type="screen16x9"/>
   <p:notesSz cx="6858000" cy="9144000"/>
@@ -3401,7 +3402,7 @@
           <p:cNvPr id="2" name="Title 1">
             <a:extLst>
               <a:ext uri="{FF2B5EF4-FFF2-40B4-BE49-F238E27FC236}">
-                <a16:creationId xmlns:a16="http://schemas.microsoft.com/office/drawing/2014/main" id="{614A2DDD-2A87-FB4C-916B-D4F3D2EE518F}"/>
+                <a16:creationId xmlns:a16="http://schemas.microsoft.com/office/drawing/2014/main" id="{BFB7ED6D-C214-F941-B744-45E4AAADE29F}"/>
               </a:ext>
             </a:extLst>
           </p:cNvPr>
@@ -3419,8 +3420,71 @@
           <a:p>
             <a:r>
               <a:rPr lang="en-US" dirty="0"/>
-              <a:t>Reasonings for SAC</a:t>
-            </a:r>
+              <a:t>EXTRA SLIDES</a:t>
+            </a:r>
+          </a:p>
+        </p:txBody>
+      </p:sp>
+    </p:spTree>
+    <p:extLst>
+      <p:ext uri="{BB962C8B-B14F-4D97-AF65-F5344CB8AC3E}">
+        <p14:creationId xmlns:p14="http://schemas.microsoft.com/office/powerpoint/2010/main" val="805800164"/>
+      </p:ext>
+    </p:extLst>
+  </p:cSld>
+  <p:clrMapOvr>
+    <a:masterClrMapping/>
+  </p:clrMapOvr>
+</p:sld>
+</file>
+
+<file path=ppt/slides/slide14.xml><?xml version="1.0" encoding="utf-8"?>
+<p:sld xmlns:a="http://schemas.openxmlformats.org/drawingml/2006/main" xmlns:r="http://schemas.openxmlformats.org/officeDocument/2006/relationships" xmlns:p="http://schemas.openxmlformats.org/presentationml/2006/main">
+  <p:cSld>
+    <p:spTree>
+      <p:nvGrpSpPr>
+        <p:cNvPr id="1" name=""/>
+        <p:cNvGrpSpPr/>
+        <p:nvPr/>
+      </p:nvGrpSpPr>
+      <p:grpSpPr>
+        <a:xfrm>
+          <a:off x="0" y="0"/>
+          <a:ext cx="0" cy="0"/>
+          <a:chOff x="0" y="0"/>
+          <a:chExt cx="0" cy="0"/>
+        </a:xfrm>
+      </p:grpSpPr>
+      <p:sp>
+        <p:nvSpPr>
+          <p:cNvPr id="2" name="Title 1">
+            <a:extLst>
+              <a:ext uri="{FF2B5EF4-FFF2-40B4-BE49-F238E27FC236}">
+                <a16:creationId xmlns:a16="http://schemas.microsoft.com/office/drawing/2014/main" id="{F0508855-F6C6-714A-B0B4-C7E671CAB3E8}"/>
+              </a:ext>
+            </a:extLst>
+          </p:cNvPr>
+          <p:cNvSpPr>
+            <a:spLocks noGrp="1"/>
+          </p:cNvSpPr>
+          <p:nvPr>
+            <p:ph type="title"/>
+          </p:nvPr>
+        </p:nvSpPr>
+        <p:spPr/>
+        <p:txBody>
+          <a:bodyPr/>
+          <a:lstStyle/>
+          <a:p>
+            <a:r>
+              <a:rPr lang="en-US" dirty="0"/>
+              <a:t>Variogram/</a:t>
+            </a:r>
+            <a:r>
+              <a:rPr lang="en-US" dirty="0" err="1"/>
+              <a:t>semivariogram</a:t>
+            </a:r>
+            <a:endParaRPr lang="en-US" dirty="0"/>
           </a:p>
         </p:txBody>
       </p:sp>
@@ -3429,7 +3493,7 @@
           <p:cNvPr id="3" name="Text Placeholder 2">
             <a:extLst>
               <a:ext uri="{FF2B5EF4-FFF2-40B4-BE49-F238E27FC236}">
-                <a16:creationId xmlns:a16="http://schemas.microsoft.com/office/drawing/2014/main" id="{F7E2DA19-9AC3-2346-A70D-FB7B1FF59E2D}"/>
+                <a16:creationId xmlns:a16="http://schemas.microsoft.com/office/drawing/2014/main" id="{312CDC9F-52F9-8142-9452-1367F54E1AF5}"/>
               </a:ext>
             </a:extLst>
           </p:cNvPr>
@@ -3447,78 +3511,51 @@
           <a:p>
             <a:r>
               <a:rPr lang="en-US" dirty="0"/>
-              <a:t>1. Spatial Autocorrelation</a:t>
-            </a:r>
-          </a:p>
-          <a:p>
-            <a:endParaRPr lang="en-US" dirty="0"/>
-          </a:p>
-        </p:txBody>
-      </p:sp>
-      <p:sp>
-        <p:nvSpPr>
-          <p:cNvPr id="5" name="Text Placeholder 3">
+              <a:t>Extra slides</a:t>
+            </a:r>
+          </a:p>
+        </p:txBody>
+      </p:sp>
+      <p:pic>
+        <p:nvPicPr>
+          <p:cNvPr id="6" name="Picture 5" descr="Chart, line chart&#10;&#10;Description automatically generated">
             <a:extLst>
               <a:ext uri="{FF2B5EF4-FFF2-40B4-BE49-F238E27FC236}">
-                <a16:creationId xmlns:a16="http://schemas.microsoft.com/office/drawing/2014/main" id="{EA9E51CB-C4FE-D540-8E63-ECEAA6B24738}"/>
+                <a16:creationId xmlns:a16="http://schemas.microsoft.com/office/drawing/2014/main" id="{48B4DFCB-1F2C-EB49-B5C8-A5005582895A}"/>
               </a:ext>
             </a:extLst>
           </p:cNvPr>
-          <p:cNvSpPr>
-            <a:spLocks noGrp="1"/>
-          </p:cNvSpPr>
-          <p:nvPr>
-            <p:ph type="body" sz="quarter" idx="11"/>
-          </p:nvPr>
-        </p:nvSpPr>
+          <p:cNvPicPr>
+            <a:picLocks noChangeAspect="1"/>
+          </p:cNvPicPr>
+          <p:nvPr/>
+        </p:nvPicPr>
+        <p:blipFill>
+          <a:blip r:embed="rId2">
+            <a:extLst>
+              <a:ext uri="{28A0092B-C50C-407E-A947-70E740481C1C}">
+                <a14:useLocalDpi xmlns:a14="http://schemas.microsoft.com/office/drawing/2010/main" val="0"/>
+              </a:ext>
+            </a:extLst>
+          </a:blip>
+          <a:stretch>
+            <a:fillRect/>
+          </a:stretch>
+        </p:blipFill>
         <p:spPr>
           <a:xfrm>
-            <a:off x="690680" y="1355611"/>
-            <a:ext cx="7509942" cy="2288381"/>
+            <a:off x="2342145" y="1064298"/>
+            <a:ext cx="4459709" cy="3321586"/>
           </a:xfrm>
+          <a:prstGeom prst="rect">
+            <a:avLst/>
+          </a:prstGeom>
         </p:spPr>
-        <p:txBody>
-          <a:bodyPr/>
-          <a:lstStyle/>
-          <a:p>
-            <a:r>
-              <a:rPr lang="en-US" sz="1600" dirty="0"/>
-              <a:t>Why should I care about spatial autocorrelation?</a:t>
-            </a:r>
-          </a:p>
-          <a:p>
-            <a:pPr marL="285750" indent="-285750">
-              <a:buFont typeface="Arial" panose="020B0604020202020204" pitchFamily="34" charset="0"/>
-              <a:buChar char="•"/>
-            </a:pPr>
-            <a:r>
-              <a:rPr lang="en-US" sz="1600" dirty="0"/>
-              <a:t>Spatial data is usually locationally dependent.  This can result in a dataset appearing to have correlations which may be due to their inherent locational dependence, rather than the correlations of other non-related variables.</a:t>
-            </a:r>
-          </a:p>
-          <a:p>
-            <a:pPr marL="285750" indent="-285750">
-              <a:buFont typeface="Arial" panose="020B0604020202020204" pitchFamily="34" charset="0"/>
-              <a:buChar char="•"/>
-            </a:pPr>
-            <a:endParaRPr lang="en-US" sz="1600" dirty="0"/>
-          </a:p>
-          <a:p>
-            <a:pPr marL="285750" indent="-285750">
-              <a:buFont typeface="Arial" panose="020B0604020202020204" pitchFamily="34" charset="0"/>
-              <a:buChar char="•"/>
-            </a:pPr>
-            <a:r>
-              <a:rPr lang="en-US" sz="1600" dirty="0"/>
-              <a:t>Its good to have a sense of how spatially autocorrelated a dataset may be, when you are applying other spatial analysis techniques</a:t>
-            </a:r>
-          </a:p>
-        </p:txBody>
-      </p:sp>
+      </p:pic>
     </p:spTree>
     <p:extLst>
       <p:ext uri="{BB962C8B-B14F-4D97-AF65-F5344CB8AC3E}">
-        <p14:creationId xmlns:p14="http://schemas.microsoft.com/office/powerpoint/2010/main" val="1305736529"/>
+        <p14:creationId xmlns:p14="http://schemas.microsoft.com/office/powerpoint/2010/main" val="2150130493"/>
       </p:ext>
     </p:extLst>
   </p:cSld>

</xml_diff>

<commit_message>
updated SAC and presentation apr 27
</commit_message>
<xml_diff>
--- a/doc/BCB_Intro_Advanced_Analysis_1_2021.pptx
+++ b/doc/BCB_Intro_Advanced_Analysis_1_2021.pptx
@@ -14,15 +14,15 @@
     <p:sldId id="451" r:id="rId5"/>
     <p:sldId id="440" r:id="rId6"/>
     <p:sldId id="452" r:id="rId7"/>
-    <p:sldId id="444" r:id="rId8"/>
-    <p:sldId id="445" r:id="rId9"/>
-    <p:sldId id="446" r:id="rId10"/>
-    <p:sldId id="447" r:id="rId11"/>
-    <p:sldId id="448" r:id="rId12"/>
-    <p:sldId id="449" r:id="rId13"/>
-    <p:sldId id="450" r:id="rId14"/>
-    <p:sldId id="454" r:id="rId15"/>
-    <p:sldId id="453" r:id="rId16"/>
+    <p:sldId id="453" r:id="rId8"/>
+    <p:sldId id="444" r:id="rId9"/>
+    <p:sldId id="445" r:id="rId10"/>
+    <p:sldId id="446" r:id="rId11"/>
+    <p:sldId id="447" r:id="rId12"/>
+    <p:sldId id="448" r:id="rId13"/>
+    <p:sldId id="449" r:id="rId14"/>
+    <p:sldId id="450" r:id="rId15"/>
+    <p:sldId id="454" r:id="rId16"/>
   </p:sldIdLst>
   <p:sldSz cx="9144000" cy="5143500" type="screen16x9"/>
   <p:notesSz cx="6858000" cy="9144000"/>
@@ -788,6 +788,201 @@
     <p:extLst>
       <p:ext uri="{BB962C8B-B14F-4D97-AF65-F5344CB8AC3E}">
         <p14:creationId xmlns:p14="http://schemas.microsoft.com/office/powerpoint/2010/main" val="2548510761"/>
+      </p:ext>
+    </p:extLst>
+  </p:cSld>
+  <p:clrMapOvr>
+    <a:masterClrMapping/>
+  </p:clrMapOvr>
+</p:notes>
+</file>
+
+<file path=ppt/notesSlides/notesSlide4.xml><?xml version="1.0" encoding="utf-8"?>
+<p:notes xmlns:a="http://schemas.openxmlformats.org/drawingml/2006/main" xmlns:r="http://schemas.openxmlformats.org/officeDocument/2006/relationships" xmlns:p="http://schemas.openxmlformats.org/presentationml/2006/main">
+  <p:cSld>
+    <p:spTree>
+      <p:nvGrpSpPr>
+        <p:cNvPr id="1" name=""/>
+        <p:cNvGrpSpPr/>
+        <p:nvPr/>
+      </p:nvGrpSpPr>
+      <p:grpSpPr>
+        <a:xfrm>
+          <a:off x="0" y="0"/>
+          <a:ext cx="0" cy="0"/>
+          <a:chOff x="0" y="0"/>
+          <a:chExt cx="0" cy="0"/>
+        </a:xfrm>
+      </p:grpSpPr>
+      <p:sp>
+        <p:nvSpPr>
+          <p:cNvPr id="2" name="Slide Image Placeholder 1"/>
+          <p:cNvSpPr>
+            <a:spLocks noGrp="1" noRot="1" noChangeAspect="1"/>
+          </p:cNvSpPr>
+          <p:nvPr>
+            <p:ph type="sldImg"/>
+          </p:nvPr>
+        </p:nvSpPr>
+        <p:spPr/>
+      </p:sp>
+      <p:sp>
+        <p:nvSpPr>
+          <p:cNvPr id="3" name="Notes Placeholder 2"/>
+          <p:cNvSpPr>
+            <a:spLocks noGrp="1"/>
+          </p:cNvSpPr>
+          <p:nvPr>
+            <p:ph type="body" idx="1"/>
+          </p:nvPr>
+        </p:nvSpPr>
+        <p:spPr/>
+        <p:txBody>
+          <a:bodyPr/>
+          <a:lstStyle/>
+          <a:p>
+            <a:r>
+              <a:rPr lang="en-US" sz="900" b="0" i="0" u="none" strike="noStrike" kern="1200" dirty="0">
+                <a:solidFill>
+                  <a:schemeClr val="tx1"/>
+                </a:solidFill>
+                <a:effectLst/>
+                <a:latin typeface="+mn-lt"/>
+                <a:ea typeface="+mn-ea"/>
+                <a:cs typeface="+mn-cs"/>
+              </a:rPr>
+              <a:t>The nugget effect can be attributed to measurement errors or spatial sources of variation at distances smaller than the sampling interval or both. </a:t>
+            </a:r>
+          </a:p>
+          <a:p>
+            <a:endParaRPr lang="en-US" sz="900" b="0" i="0" u="none" strike="noStrike" kern="1200" dirty="0">
+              <a:solidFill>
+                <a:schemeClr val="tx1"/>
+              </a:solidFill>
+              <a:effectLst/>
+              <a:latin typeface="+mn-lt"/>
+              <a:ea typeface="+mn-ea"/>
+              <a:cs typeface="+mn-cs"/>
+            </a:endParaRPr>
+          </a:p>
+          <a:p>
+            <a:r>
+              <a:rPr lang="en-US" sz="900" b="0" i="0" u="none" strike="noStrike" kern="1200" dirty="0">
+                <a:solidFill>
+                  <a:schemeClr val="tx1"/>
+                </a:solidFill>
+                <a:effectLst/>
+                <a:latin typeface="+mn-lt"/>
+                <a:ea typeface="+mn-ea"/>
+                <a:cs typeface="+mn-cs"/>
+              </a:rPr>
+              <a:t>Measurement error occurs because of the error inherent in measuring devices. Natural phenomena can vary spatially over a range of scales. </a:t>
+            </a:r>
+          </a:p>
+          <a:p>
+            <a:endParaRPr lang="en-US" sz="900" b="0" i="0" u="none" strike="noStrike" kern="1200" dirty="0">
+              <a:solidFill>
+                <a:schemeClr val="tx1"/>
+              </a:solidFill>
+              <a:effectLst/>
+              <a:latin typeface="+mn-lt"/>
+              <a:ea typeface="+mn-ea"/>
+              <a:cs typeface="+mn-cs"/>
+            </a:endParaRPr>
+          </a:p>
+          <a:p>
+            <a:r>
+              <a:rPr lang="en-US" sz="900" b="0" i="0" u="none" strike="noStrike" kern="1200" dirty="0">
+                <a:solidFill>
+                  <a:schemeClr val="tx1"/>
+                </a:solidFill>
+                <a:effectLst/>
+                <a:latin typeface="+mn-lt"/>
+                <a:ea typeface="+mn-ea"/>
+                <a:cs typeface="+mn-cs"/>
+              </a:rPr>
+              <a:t>Variation at microscales smaller than the sampling distances will appear as part of the nugget effect. Before collecting data, it is important to gain some understanding of the scales of spatial variation.</a:t>
+            </a:r>
+          </a:p>
+          <a:p>
+            <a:endParaRPr lang="en-US" sz="900" b="0" i="0" u="none" strike="noStrike" kern="1200" dirty="0">
+              <a:solidFill>
+                <a:schemeClr val="tx1"/>
+              </a:solidFill>
+              <a:effectLst/>
+              <a:latin typeface="+mn-lt"/>
+              <a:ea typeface="+mn-ea"/>
+              <a:cs typeface="+mn-cs"/>
+            </a:endParaRPr>
+          </a:p>
+          <a:p>
+            <a:r>
+              <a:rPr lang="en-US" sz="900" b="0" i="0" u="none" strike="noStrike" kern="1200" dirty="0">
+                <a:solidFill>
+                  <a:schemeClr val="tx1"/>
+                </a:solidFill>
+                <a:effectLst/>
+                <a:latin typeface="+mn-lt"/>
+                <a:ea typeface="+mn-ea"/>
+                <a:cs typeface="+mn-cs"/>
+              </a:rPr>
+              <a:t>Therefore - the nugget effect is simply the sum of measurement error and microscale variation and, since either component can be zero, the nugget effect can be composed wholly of one or the other. The distance at which the </a:t>
+            </a:r>
+            <a:r>
+              <a:rPr lang="en-US" sz="900" b="0" i="0" u="none" strike="noStrike" kern="1200" dirty="0" err="1">
+                <a:solidFill>
+                  <a:schemeClr val="tx1"/>
+                </a:solidFill>
+                <a:effectLst/>
+                <a:latin typeface="+mn-lt"/>
+                <a:ea typeface="+mn-ea"/>
+                <a:cs typeface="+mn-cs"/>
+              </a:rPr>
+              <a:t>semivariogram</a:t>
+            </a:r>
+            <a:r>
+              <a:rPr lang="en-US" sz="900" b="0" i="0" u="none" strike="noStrike" kern="1200" dirty="0">
+                <a:solidFill>
+                  <a:schemeClr val="tx1"/>
+                </a:solidFill>
+                <a:effectLst/>
+                <a:latin typeface="+mn-lt"/>
+                <a:ea typeface="+mn-ea"/>
+                <a:cs typeface="+mn-cs"/>
+              </a:rPr>
+              <a:t> levels off to the sill is called the range.</a:t>
+            </a:r>
+            <a:endParaRPr lang="en-US" dirty="0"/>
+          </a:p>
+        </p:txBody>
+      </p:sp>
+      <p:sp>
+        <p:nvSpPr>
+          <p:cNvPr id="4" name="Slide Number Placeholder 3"/>
+          <p:cNvSpPr>
+            <a:spLocks noGrp="1"/>
+          </p:cNvSpPr>
+          <p:nvPr>
+            <p:ph type="sldNum" sz="quarter" idx="5"/>
+          </p:nvPr>
+        </p:nvSpPr>
+        <p:spPr/>
+        <p:txBody>
+          <a:bodyPr/>
+          <a:lstStyle/>
+          <a:p>
+            <a:fld id="{8B0993E8-77CB-4CE8-8134-9D98A3510F3A}" type="slidenum">
+              <a:rPr lang="en-US" smtClean="0"/>
+              <a:t>6</a:t>
+            </a:fld>
+            <a:endParaRPr lang="en-US" dirty="0"/>
+          </a:p>
+        </p:txBody>
+      </p:sp>
+    </p:spTree>
+    <p:extLst>
+      <p:ext uri="{BB962C8B-B14F-4D97-AF65-F5344CB8AC3E}">
+        <p14:creationId xmlns:p14="http://schemas.microsoft.com/office/powerpoint/2010/main" val="2323891030"/>
       </p:ext>
     </p:extLst>
   </p:cSld>
@@ -2749,6 +2944,163 @@
           <p:cNvPr id="2" name="Title 1">
             <a:extLst>
               <a:ext uri="{FF2B5EF4-FFF2-40B4-BE49-F238E27FC236}">
+                <a16:creationId xmlns:a16="http://schemas.microsoft.com/office/drawing/2014/main" id="{B09A0552-027A-E940-8B84-F6B877E6717D}"/>
+              </a:ext>
+            </a:extLst>
+          </p:cNvPr>
+          <p:cNvSpPr>
+            <a:spLocks noGrp="1"/>
+          </p:cNvSpPr>
+          <p:nvPr>
+            <p:ph type="title"/>
+          </p:nvPr>
+        </p:nvSpPr>
+        <p:spPr/>
+        <p:txBody>
+          <a:bodyPr/>
+          <a:lstStyle/>
+          <a:p>
+            <a:r>
+              <a:rPr lang="en-US" dirty="0"/>
+              <a:t>Introduction to kriging</a:t>
+            </a:r>
+          </a:p>
+        </p:txBody>
+      </p:sp>
+      <p:sp>
+        <p:nvSpPr>
+          <p:cNvPr id="3" name="Text Placeholder 2">
+            <a:extLst>
+              <a:ext uri="{FF2B5EF4-FFF2-40B4-BE49-F238E27FC236}">
+                <a16:creationId xmlns:a16="http://schemas.microsoft.com/office/drawing/2014/main" id="{29B23574-E1AE-5D4E-A92B-41CAD1AF7D5A}"/>
+              </a:ext>
+            </a:extLst>
+          </p:cNvPr>
+          <p:cNvSpPr>
+            <a:spLocks noGrp="1"/>
+          </p:cNvSpPr>
+          <p:nvPr>
+            <p:ph type="body" sz="quarter" idx="10"/>
+          </p:nvPr>
+        </p:nvSpPr>
+        <p:spPr/>
+        <p:txBody>
+          <a:bodyPr/>
+          <a:lstStyle/>
+          <a:p>
+            <a:r>
+              <a:rPr lang="en-US" dirty="0"/>
+              <a:t>2. Kriging</a:t>
+            </a:r>
+          </a:p>
+        </p:txBody>
+      </p:sp>
+      <p:sp>
+        <p:nvSpPr>
+          <p:cNvPr id="5" name="Rectangle 4">
+            <a:extLst>
+              <a:ext uri="{FF2B5EF4-FFF2-40B4-BE49-F238E27FC236}">
+                <a16:creationId xmlns:a16="http://schemas.microsoft.com/office/drawing/2014/main" id="{81DD6188-9C46-9248-B7A2-EC5E2D7BA323}"/>
+              </a:ext>
+            </a:extLst>
+          </p:cNvPr>
+          <p:cNvSpPr/>
+          <p:nvPr/>
+        </p:nvSpPr>
+        <p:spPr>
+          <a:xfrm>
+            <a:off x="539452" y="1553080"/>
+            <a:ext cx="8065095" cy="1815882"/>
+          </a:xfrm>
+          <a:prstGeom prst="rect">
+            <a:avLst/>
+          </a:prstGeom>
+        </p:spPr>
+        <p:txBody>
+          <a:bodyPr wrap="square">
+            <a:spAutoFit/>
+          </a:bodyPr>
+          <a:lstStyle/>
+          <a:p>
+            <a:r>
+              <a:rPr lang="en-US" b="1" dirty="0"/>
+              <a:t>Kriging</a:t>
+            </a:r>
+            <a:r>
+              <a:rPr lang="en-US" dirty="0"/>
+              <a:t> is a group of geostatistical techniques to interpolate the value of a random field at an un-sampled location from known observations of its value at nearby locations. </a:t>
+            </a:r>
+          </a:p>
+          <a:p>
+            <a:endParaRPr lang="en-US" dirty="0"/>
+          </a:p>
+          <a:p>
+            <a:r>
+              <a:rPr lang="en-US" dirty="0"/>
+              <a:t>The main statistical assumption behind kriging is one of </a:t>
+            </a:r>
+            <a:r>
+              <a:rPr lang="en-US" b="1" dirty="0"/>
+              <a:t>stationarity</a:t>
+            </a:r>
+            <a:r>
+              <a:rPr lang="en-US" dirty="0"/>
+              <a:t> which means that statistical properties (such as </a:t>
+            </a:r>
+            <a:r>
+              <a:rPr lang="en-US" b="1" dirty="0"/>
+              <a:t>mean and variance</a:t>
+            </a:r>
+            <a:r>
+              <a:rPr lang="en-US" dirty="0"/>
+              <a:t>) do not depend on the exact spatial locations, so the mean and variance of a variable at one location is equal to the mean and variance at another location. </a:t>
+            </a:r>
+          </a:p>
+          <a:p>
+            <a:br>
+              <a:rPr lang="en-US" dirty="0"/>
+            </a:br>
+            <a:endParaRPr lang="en-US" dirty="0">
+              <a:effectLst/>
+            </a:endParaRPr>
+          </a:p>
+        </p:txBody>
+      </p:sp>
+    </p:spTree>
+    <p:extLst>
+      <p:ext uri="{BB962C8B-B14F-4D97-AF65-F5344CB8AC3E}">
+        <p14:creationId xmlns:p14="http://schemas.microsoft.com/office/powerpoint/2010/main" val="3849745909"/>
+      </p:ext>
+    </p:extLst>
+  </p:cSld>
+  <p:clrMapOvr>
+    <a:masterClrMapping/>
+  </p:clrMapOvr>
+</p:sld>
+</file>
+
+<file path=ppt/slides/slide11.xml><?xml version="1.0" encoding="utf-8"?>
+<p:sld xmlns:a="http://schemas.openxmlformats.org/drawingml/2006/main" xmlns:r="http://schemas.openxmlformats.org/officeDocument/2006/relationships" xmlns:p="http://schemas.openxmlformats.org/presentationml/2006/main">
+  <p:cSld>
+    <p:spTree>
+      <p:nvGrpSpPr>
+        <p:cNvPr id="1" name=""/>
+        <p:cNvGrpSpPr/>
+        <p:nvPr/>
+      </p:nvGrpSpPr>
+      <p:grpSpPr>
+        <a:xfrm>
+          <a:off x="0" y="0"/>
+          <a:ext cx="0" cy="0"/>
+          <a:chOff x="0" y="0"/>
+          <a:chExt cx="0" cy="0"/>
+        </a:xfrm>
+      </p:grpSpPr>
+      <p:sp>
+        <p:nvSpPr>
+          <p:cNvPr id="2" name="Title 1">
+            <a:extLst>
+              <a:ext uri="{FF2B5EF4-FFF2-40B4-BE49-F238E27FC236}">
                 <a16:creationId xmlns:a16="http://schemas.microsoft.com/office/drawing/2014/main" id="{C01D11B2-48E2-5C41-9D42-ADF562F68AA6}"/>
               </a:ext>
             </a:extLst>
@@ -2896,7 +3248,7 @@
 </p:sld>
 </file>
 
-<file path=ppt/slides/slide11.xml><?xml version="1.0" encoding="utf-8"?>
+<file path=ppt/slides/slide12.xml><?xml version="1.0" encoding="utf-8"?>
 <p:sld xmlns:a="http://schemas.openxmlformats.org/drawingml/2006/main" xmlns:r="http://schemas.openxmlformats.org/officeDocument/2006/relationships" xmlns:p="http://schemas.openxmlformats.org/presentationml/2006/main">
   <p:cSld>
     <p:spTree>
@@ -3059,7 +3411,7 @@
 </p:sld>
 </file>
 
-<file path=ppt/slides/slide12.xml><?xml version="1.0" encoding="utf-8"?>
+<file path=ppt/slides/slide13.xml><?xml version="1.0" encoding="utf-8"?>
 <p:sld xmlns:a="http://schemas.openxmlformats.org/drawingml/2006/main" xmlns:r="http://schemas.openxmlformats.org/officeDocument/2006/relationships" xmlns:p="http://schemas.openxmlformats.org/presentationml/2006/main">
   <p:cSld>
     <p:spTree>
@@ -3380,64 +3732,6 @@
 </p:sld>
 </file>
 
-<file path=ppt/slides/slide13.xml><?xml version="1.0" encoding="utf-8"?>
-<p:sld xmlns:a="http://schemas.openxmlformats.org/drawingml/2006/main" xmlns:r="http://schemas.openxmlformats.org/officeDocument/2006/relationships" xmlns:p="http://schemas.openxmlformats.org/presentationml/2006/main">
-  <p:cSld>
-    <p:spTree>
-      <p:nvGrpSpPr>
-        <p:cNvPr id="1" name=""/>
-        <p:cNvGrpSpPr/>
-        <p:nvPr/>
-      </p:nvGrpSpPr>
-      <p:grpSpPr>
-        <a:xfrm>
-          <a:off x="0" y="0"/>
-          <a:ext cx="0" cy="0"/>
-          <a:chOff x="0" y="0"/>
-          <a:chExt cx="0" cy="0"/>
-        </a:xfrm>
-      </p:grpSpPr>
-      <p:sp>
-        <p:nvSpPr>
-          <p:cNvPr id="2" name="Title 1">
-            <a:extLst>
-              <a:ext uri="{FF2B5EF4-FFF2-40B4-BE49-F238E27FC236}">
-                <a16:creationId xmlns:a16="http://schemas.microsoft.com/office/drawing/2014/main" id="{BFB7ED6D-C214-F941-B744-45E4AAADE29F}"/>
-              </a:ext>
-            </a:extLst>
-          </p:cNvPr>
-          <p:cNvSpPr>
-            <a:spLocks noGrp="1"/>
-          </p:cNvSpPr>
-          <p:nvPr>
-            <p:ph type="title"/>
-          </p:nvPr>
-        </p:nvSpPr>
-        <p:spPr/>
-        <p:txBody>
-          <a:bodyPr/>
-          <a:lstStyle/>
-          <a:p>
-            <a:r>
-              <a:rPr lang="en-US" dirty="0"/>
-              <a:t>EXTRA SLIDES</a:t>
-            </a:r>
-          </a:p>
-        </p:txBody>
-      </p:sp>
-    </p:spTree>
-    <p:extLst>
-      <p:ext uri="{BB962C8B-B14F-4D97-AF65-F5344CB8AC3E}">
-        <p14:creationId xmlns:p14="http://schemas.microsoft.com/office/powerpoint/2010/main" val="805800164"/>
-      </p:ext>
-    </p:extLst>
-  </p:cSld>
-  <p:clrMapOvr>
-    <a:masterClrMapping/>
-  </p:clrMapOvr>
-</p:sld>
-</file>
-
 <file path=ppt/slides/slide14.xml><?xml version="1.0" encoding="utf-8"?>
 <p:sld xmlns:a="http://schemas.openxmlformats.org/drawingml/2006/main" xmlns:r="http://schemas.openxmlformats.org/officeDocument/2006/relationships" xmlns:p="http://schemas.openxmlformats.org/presentationml/2006/main">
   <p:cSld>
@@ -3460,7 +3754,7 @@
           <p:cNvPr id="2" name="Title 1">
             <a:extLst>
               <a:ext uri="{FF2B5EF4-FFF2-40B4-BE49-F238E27FC236}">
-                <a16:creationId xmlns:a16="http://schemas.microsoft.com/office/drawing/2014/main" id="{F0508855-F6C6-714A-B0B4-C7E671CAB3E8}"/>
+                <a16:creationId xmlns:a16="http://schemas.microsoft.com/office/drawing/2014/main" id="{BFB7ED6D-C214-F941-B744-45E4AAADE29F}"/>
               </a:ext>
             </a:extLst>
           </p:cNvPr>
@@ -3478,84 +3772,15 @@
           <a:p>
             <a:r>
               <a:rPr lang="en-US" dirty="0"/>
-              <a:t>Variogram/</a:t>
-            </a:r>
-            <a:r>
-              <a:rPr lang="en-US" dirty="0" err="1"/>
-              <a:t>semivariogram</a:t>
-            </a:r>
-            <a:endParaRPr lang="en-US" dirty="0"/>
-          </a:p>
-        </p:txBody>
-      </p:sp>
-      <p:sp>
-        <p:nvSpPr>
-          <p:cNvPr id="3" name="Text Placeholder 2">
-            <a:extLst>
-              <a:ext uri="{FF2B5EF4-FFF2-40B4-BE49-F238E27FC236}">
-                <a16:creationId xmlns:a16="http://schemas.microsoft.com/office/drawing/2014/main" id="{312CDC9F-52F9-8142-9452-1367F54E1AF5}"/>
-              </a:ext>
-            </a:extLst>
-          </p:cNvPr>
-          <p:cNvSpPr>
-            <a:spLocks noGrp="1"/>
-          </p:cNvSpPr>
-          <p:nvPr>
-            <p:ph type="body" sz="quarter" idx="10"/>
-          </p:nvPr>
-        </p:nvSpPr>
-        <p:spPr/>
-        <p:txBody>
-          <a:bodyPr/>
-          <a:lstStyle/>
-          <a:p>
-            <a:r>
-              <a:rPr lang="en-US" dirty="0"/>
-              <a:t>Extra slides</a:t>
-            </a:r>
-          </a:p>
-        </p:txBody>
-      </p:sp>
-      <p:pic>
-        <p:nvPicPr>
-          <p:cNvPr id="6" name="Picture 5" descr="Chart, line chart&#10;&#10;Description automatically generated">
-            <a:extLst>
-              <a:ext uri="{FF2B5EF4-FFF2-40B4-BE49-F238E27FC236}">
-                <a16:creationId xmlns:a16="http://schemas.microsoft.com/office/drawing/2014/main" id="{48B4DFCB-1F2C-EB49-B5C8-A5005582895A}"/>
-              </a:ext>
-            </a:extLst>
-          </p:cNvPr>
-          <p:cNvPicPr>
-            <a:picLocks noChangeAspect="1"/>
-          </p:cNvPicPr>
-          <p:nvPr/>
-        </p:nvPicPr>
-        <p:blipFill>
-          <a:blip r:embed="rId2">
-            <a:extLst>
-              <a:ext uri="{28A0092B-C50C-407E-A947-70E740481C1C}">
-                <a14:useLocalDpi xmlns:a14="http://schemas.microsoft.com/office/drawing/2010/main" val="0"/>
-              </a:ext>
-            </a:extLst>
-          </a:blip>
-          <a:stretch>
-            <a:fillRect/>
-          </a:stretch>
-        </p:blipFill>
-        <p:spPr>
-          <a:xfrm>
-            <a:off x="2342145" y="1064298"/>
-            <a:ext cx="4459709" cy="3321586"/>
-          </a:xfrm>
-          <a:prstGeom prst="rect">
-            <a:avLst/>
-          </a:prstGeom>
-        </p:spPr>
-      </p:pic>
+              <a:t>EXTRA SLIDES</a:t>
+            </a:r>
+          </a:p>
+        </p:txBody>
+      </p:sp>
     </p:spTree>
     <p:extLst>
       <p:ext uri="{BB962C8B-B14F-4D97-AF65-F5344CB8AC3E}">
-        <p14:creationId xmlns:p14="http://schemas.microsoft.com/office/powerpoint/2010/main" val="2150130493"/>
+        <p14:creationId xmlns:p14="http://schemas.microsoft.com/office/powerpoint/2010/main" val="805800164"/>
       </p:ext>
     </p:extLst>
   </p:cSld>
@@ -4653,6 +4878,250 @@
           <p:cNvPr id="2" name="Title 1">
             <a:extLst>
               <a:ext uri="{FF2B5EF4-FFF2-40B4-BE49-F238E27FC236}">
+                <a16:creationId xmlns:a16="http://schemas.microsoft.com/office/drawing/2014/main" id="{F0508855-F6C6-714A-B0B4-C7E671CAB3E8}"/>
+              </a:ext>
+            </a:extLst>
+          </p:cNvPr>
+          <p:cNvSpPr>
+            <a:spLocks noGrp="1"/>
+          </p:cNvSpPr>
+          <p:nvPr>
+            <p:ph type="title"/>
+          </p:nvPr>
+        </p:nvSpPr>
+        <p:spPr/>
+        <p:txBody>
+          <a:bodyPr/>
+          <a:lstStyle/>
+          <a:p>
+            <a:r>
+              <a:rPr lang="en-US" dirty="0"/>
+              <a:t>Variogram/</a:t>
+            </a:r>
+            <a:r>
+              <a:rPr lang="en-US" dirty="0" err="1"/>
+              <a:t>semivariogram</a:t>
+            </a:r>
+            <a:endParaRPr lang="en-US" dirty="0"/>
+          </a:p>
+        </p:txBody>
+      </p:sp>
+      <p:sp>
+        <p:nvSpPr>
+          <p:cNvPr id="3" name="Text Placeholder 2">
+            <a:extLst>
+              <a:ext uri="{FF2B5EF4-FFF2-40B4-BE49-F238E27FC236}">
+                <a16:creationId xmlns:a16="http://schemas.microsoft.com/office/drawing/2014/main" id="{312CDC9F-52F9-8142-9452-1367F54E1AF5}"/>
+              </a:ext>
+            </a:extLst>
+          </p:cNvPr>
+          <p:cNvSpPr>
+            <a:spLocks noGrp="1"/>
+          </p:cNvSpPr>
+          <p:nvPr>
+            <p:ph type="body" sz="quarter" idx="10"/>
+          </p:nvPr>
+        </p:nvSpPr>
+        <p:spPr/>
+        <p:txBody>
+          <a:bodyPr/>
+          <a:lstStyle/>
+          <a:p>
+            <a:r>
+              <a:rPr lang="en-US" dirty="0"/>
+              <a:t>1. Spatial Autocorrelation</a:t>
+            </a:r>
+          </a:p>
+          <a:p>
+            <a:endParaRPr lang="en-US" dirty="0"/>
+          </a:p>
+        </p:txBody>
+      </p:sp>
+      <p:pic>
+        <p:nvPicPr>
+          <p:cNvPr id="6" name="Picture 5" descr="Chart, line chart&#10;&#10;Description automatically generated">
+            <a:extLst>
+              <a:ext uri="{FF2B5EF4-FFF2-40B4-BE49-F238E27FC236}">
+                <a16:creationId xmlns:a16="http://schemas.microsoft.com/office/drawing/2014/main" id="{48B4DFCB-1F2C-EB49-B5C8-A5005582895A}"/>
+              </a:ext>
+            </a:extLst>
+          </p:cNvPr>
+          <p:cNvPicPr>
+            <a:picLocks noChangeAspect="1"/>
+          </p:cNvPicPr>
+          <p:nvPr/>
+        </p:nvPicPr>
+        <p:blipFill>
+          <a:blip r:embed="rId3">
+            <a:extLst>
+              <a:ext uri="{28A0092B-C50C-407E-A947-70E740481C1C}">
+                <a14:useLocalDpi xmlns:a14="http://schemas.microsoft.com/office/drawing/2010/main" val="0"/>
+              </a:ext>
+            </a:extLst>
+          </a:blip>
+          <a:stretch>
+            <a:fillRect/>
+          </a:stretch>
+        </p:blipFill>
+        <p:spPr>
+          <a:xfrm>
+            <a:off x="882799" y="1064298"/>
+            <a:ext cx="4459709" cy="3321586"/>
+          </a:xfrm>
+          <a:prstGeom prst="rect">
+            <a:avLst/>
+          </a:prstGeom>
+        </p:spPr>
+      </p:pic>
+      <p:sp>
+        <p:nvSpPr>
+          <p:cNvPr id="7" name="Rectangle 6">
+            <a:extLst>
+              <a:ext uri="{FF2B5EF4-FFF2-40B4-BE49-F238E27FC236}">
+                <a16:creationId xmlns:a16="http://schemas.microsoft.com/office/drawing/2014/main" id="{B0FDD408-3956-3A4C-8DCF-EE4369CA7265}"/>
+              </a:ext>
+            </a:extLst>
+          </p:cNvPr>
+          <p:cNvSpPr/>
+          <p:nvPr/>
+        </p:nvSpPr>
+        <p:spPr>
+          <a:xfrm>
+            <a:off x="5153527" y="1377374"/>
+            <a:ext cx="3595906" cy="1384995"/>
+          </a:xfrm>
+          <a:prstGeom prst="rect">
+            <a:avLst/>
+          </a:prstGeom>
+        </p:spPr>
+        <p:txBody>
+          <a:bodyPr wrap="square">
+            <a:spAutoFit/>
+          </a:bodyPr>
+          <a:lstStyle/>
+          <a:p>
+            <a:r>
+              <a:rPr lang="en-US" dirty="0">
+                <a:solidFill>
+                  <a:srgbClr val="6E6E6E"/>
+                </a:solidFill>
+                <a:latin typeface="Helvetica"/>
+              </a:rPr>
+              <a:t>The </a:t>
+            </a:r>
+            <a:r>
+              <a:rPr lang="en-US" dirty="0" err="1">
+                <a:solidFill>
+                  <a:srgbClr val="6E6E6E"/>
+                </a:solidFill>
+                <a:latin typeface="Helvetica"/>
+              </a:rPr>
+              <a:t>semivariogram</a:t>
+            </a:r>
+            <a:r>
+              <a:rPr lang="en-US" dirty="0">
+                <a:solidFill>
+                  <a:srgbClr val="6E6E6E"/>
+                </a:solidFill>
+                <a:latin typeface="Helvetica"/>
+              </a:rPr>
+              <a:t> depicts the spatial autocorrelation of the measured sample points. Once each pair of locations is plotted, a model is fit through them. There are certain characteristics that are commonly used to describe these models.</a:t>
+            </a:r>
+          </a:p>
+        </p:txBody>
+      </p:sp>
+      <p:sp>
+        <p:nvSpPr>
+          <p:cNvPr id="8" name="Rectangle 7">
+            <a:extLst>
+              <a:ext uri="{FF2B5EF4-FFF2-40B4-BE49-F238E27FC236}">
+                <a16:creationId xmlns:a16="http://schemas.microsoft.com/office/drawing/2014/main" id="{6777D66F-954F-9344-8629-22EB61B1CDD8}"/>
+              </a:ext>
+            </a:extLst>
+          </p:cNvPr>
+          <p:cNvSpPr/>
+          <p:nvPr/>
+        </p:nvSpPr>
+        <p:spPr>
+          <a:xfrm>
+            <a:off x="5153527" y="3204794"/>
+            <a:ext cx="3243261" cy="738664"/>
+          </a:xfrm>
+          <a:prstGeom prst="rect">
+            <a:avLst/>
+          </a:prstGeom>
+        </p:spPr>
+        <p:txBody>
+          <a:bodyPr wrap="square">
+            <a:spAutoFit/>
+          </a:bodyPr>
+          <a:lstStyle/>
+          <a:p>
+            <a:r>
+              <a:rPr lang="en-US" dirty="0">
+                <a:solidFill>
+                  <a:srgbClr val="6E6E6E"/>
+                </a:solidFill>
+                <a:latin typeface="Helvetica"/>
+              </a:rPr>
+              <a:t>The </a:t>
+            </a:r>
+            <a:r>
+              <a:rPr lang="en-US" dirty="0" err="1">
+                <a:solidFill>
+                  <a:srgbClr val="6E6E6E"/>
+                </a:solidFill>
+                <a:latin typeface="Helvetica"/>
+              </a:rPr>
+              <a:t>Semivariogram</a:t>
+            </a:r>
+            <a:r>
+              <a:rPr lang="en-US" dirty="0">
+                <a:solidFill>
+                  <a:srgbClr val="6E6E6E"/>
+                </a:solidFill>
+                <a:latin typeface="Helvetica"/>
+              </a:rPr>
+              <a:t> and covariance both measure the strength of statistical correlation as a function of distance.</a:t>
+            </a:r>
+          </a:p>
+        </p:txBody>
+      </p:sp>
+    </p:spTree>
+    <p:extLst>
+      <p:ext uri="{BB962C8B-B14F-4D97-AF65-F5344CB8AC3E}">
+        <p14:creationId xmlns:p14="http://schemas.microsoft.com/office/powerpoint/2010/main" val="2150130493"/>
+      </p:ext>
+    </p:extLst>
+  </p:cSld>
+  <p:clrMapOvr>
+    <a:masterClrMapping/>
+  </p:clrMapOvr>
+</p:sld>
+</file>
+
+<file path=ppt/slides/slide7.xml><?xml version="1.0" encoding="utf-8"?>
+<p:sld xmlns:a="http://schemas.openxmlformats.org/drawingml/2006/main" xmlns:r="http://schemas.openxmlformats.org/officeDocument/2006/relationships" xmlns:p="http://schemas.openxmlformats.org/presentationml/2006/main">
+  <p:cSld>
+    <p:spTree>
+      <p:nvGrpSpPr>
+        <p:cNvPr id="1" name=""/>
+        <p:cNvGrpSpPr/>
+        <p:nvPr/>
+      </p:nvGrpSpPr>
+      <p:grpSpPr>
+        <a:xfrm>
+          <a:off x="0" y="0"/>
+          <a:ext cx="0" cy="0"/>
+          <a:chOff x="0" y="0"/>
+          <a:chExt cx="0" cy="0"/>
+        </a:xfrm>
+      </p:grpSpPr>
+      <p:sp>
+        <p:nvSpPr>
+          <p:cNvPr id="2" name="Title 1">
+            <a:extLst>
+              <a:ext uri="{FF2B5EF4-FFF2-40B4-BE49-F238E27FC236}">
                 <a16:creationId xmlns:a16="http://schemas.microsoft.com/office/drawing/2014/main" id="{53C17DB7-ABE2-9249-BA6F-B38EAAF38A07}"/>
               </a:ext>
             </a:extLst>
@@ -4726,7 +5195,7 @@
         <p:spPr>
           <a:xfrm>
             <a:off x="901371" y="943587"/>
-            <a:ext cx="5813465" cy="3108543"/>
+            <a:ext cx="5813465" cy="2893100"/>
           </a:xfrm>
           <a:prstGeom prst="rect">
             <a:avLst/>
@@ -4753,7 +5222,7 @@
                 </a:solidFill>
                 <a:latin typeface="Source Sans Pro" panose="020B0503030403020204" pitchFamily="34" charset="0"/>
               </a:rPr>
-              <a:t>Global Moran’s I </a:t>
+              <a:t>Moran’s I </a:t>
             </a:r>
             <a:r>
               <a:rPr lang="en-US" dirty="0">
@@ -4795,6 +5264,29 @@
           <a:p>
             <a:r>
               <a:rPr lang="en-US" i="1" u="sng" dirty="0"/>
+              <a:t>Global Moran’s I </a:t>
+            </a:r>
+            <a:r>
+              <a:rPr lang="en-US" dirty="0">
+                <a:solidFill>
+                  <a:srgbClr val="333333"/>
+                </a:solidFill>
+                <a:latin typeface="Source Sans Pro" panose="020B0503030403020204" pitchFamily="34" charset="0"/>
+              </a:rPr>
+              <a:t>provides a one single value, which is the average across the dimensional space.</a:t>
+            </a:r>
+          </a:p>
+          <a:p>
+            <a:endParaRPr lang="en-US" dirty="0">
+              <a:solidFill>
+                <a:srgbClr val="333333"/>
+              </a:solidFill>
+              <a:latin typeface="Source Sans Pro" panose="020B0503030403020204" pitchFamily="34" charset="0"/>
+            </a:endParaRPr>
+          </a:p>
+          <a:p>
+            <a:r>
+              <a:rPr lang="en-US" i="1" u="sng" dirty="0"/>
               <a:t>Local Moran’s I </a:t>
             </a:r>
             <a:r>
@@ -4808,23 +5300,6 @@
             <a:r>
               <a:rPr lang="en-US" dirty="0"/>
               <a:t> (1995) as a way to identify local clusters and spatial outliers. </a:t>
-            </a:r>
-          </a:p>
-          <a:p>
-            <a:endParaRPr lang="en-US" dirty="0"/>
-          </a:p>
-          <a:p>
-            <a:r>
-              <a:rPr lang="en-US" dirty="0"/>
-              <a:t>Moran I is combined with the location of each observation in the </a:t>
-            </a:r>
-            <a:r>
-              <a:rPr lang="en-US" u="sng" dirty="0"/>
-              <a:t>Moran Scatterplot</a:t>
-            </a:r>
-            <a:r>
-              <a:rPr lang="en-US" dirty="0"/>
-              <a:t>. This allows for a classification of the significant locations as high-high and low-low spatial clusters, and high-low and low-high spatial outliers. </a:t>
             </a:r>
           </a:p>
         </p:txBody>
@@ -4878,7 +5353,7 @@
 </p:sld>
 </file>
 
-<file path=ppt/slides/slide7.xml><?xml version="1.0" encoding="utf-8"?>
+<file path=ppt/slides/slide8.xml><?xml version="1.0" encoding="utf-8"?>
 <p:sld xmlns:a="http://schemas.openxmlformats.org/drawingml/2006/main" xmlns:r="http://schemas.openxmlformats.org/officeDocument/2006/relationships" xmlns:p="http://schemas.openxmlformats.org/presentationml/2006/main">
   <p:cSld>
     <p:spTree>
@@ -5068,7 +5543,7 @@
 </p:sld>
 </file>
 
-<file path=ppt/slides/slide8.xml><?xml version="1.0" encoding="utf-8"?>
+<file path=ppt/slides/slide9.xml><?xml version="1.0" encoding="utf-8"?>
 <p:sld xmlns:a="http://schemas.openxmlformats.org/drawingml/2006/main" xmlns:r="http://schemas.openxmlformats.org/officeDocument/2006/relationships" xmlns:p="http://schemas.openxmlformats.org/presentationml/2006/main">
   <p:cSld>
     <p:spTree>
@@ -5242,163 +5717,6 @@
     <p:extLst>
       <p:ext uri="{BB962C8B-B14F-4D97-AF65-F5344CB8AC3E}">
         <p14:creationId xmlns:p14="http://schemas.microsoft.com/office/powerpoint/2010/main" val="3008153948"/>
-      </p:ext>
-    </p:extLst>
-  </p:cSld>
-  <p:clrMapOvr>
-    <a:masterClrMapping/>
-  </p:clrMapOvr>
-</p:sld>
-</file>
-
-<file path=ppt/slides/slide9.xml><?xml version="1.0" encoding="utf-8"?>
-<p:sld xmlns:a="http://schemas.openxmlformats.org/drawingml/2006/main" xmlns:r="http://schemas.openxmlformats.org/officeDocument/2006/relationships" xmlns:p="http://schemas.openxmlformats.org/presentationml/2006/main">
-  <p:cSld>
-    <p:spTree>
-      <p:nvGrpSpPr>
-        <p:cNvPr id="1" name=""/>
-        <p:cNvGrpSpPr/>
-        <p:nvPr/>
-      </p:nvGrpSpPr>
-      <p:grpSpPr>
-        <a:xfrm>
-          <a:off x="0" y="0"/>
-          <a:ext cx="0" cy="0"/>
-          <a:chOff x="0" y="0"/>
-          <a:chExt cx="0" cy="0"/>
-        </a:xfrm>
-      </p:grpSpPr>
-      <p:sp>
-        <p:nvSpPr>
-          <p:cNvPr id="2" name="Title 1">
-            <a:extLst>
-              <a:ext uri="{FF2B5EF4-FFF2-40B4-BE49-F238E27FC236}">
-                <a16:creationId xmlns:a16="http://schemas.microsoft.com/office/drawing/2014/main" id="{B09A0552-027A-E940-8B84-F6B877E6717D}"/>
-              </a:ext>
-            </a:extLst>
-          </p:cNvPr>
-          <p:cNvSpPr>
-            <a:spLocks noGrp="1"/>
-          </p:cNvSpPr>
-          <p:nvPr>
-            <p:ph type="title"/>
-          </p:nvPr>
-        </p:nvSpPr>
-        <p:spPr/>
-        <p:txBody>
-          <a:bodyPr/>
-          <a:lstStyle/>
-          <a:p>
-            <a:r>
-              <a:rPr lang="en-US" dirty="0"/>
-              <a:t>Introduction to kriging</a:t>
-            </a:r>
-          </a:p>
-        </p:txBody>
-      </p:sp>
-      <p:sp>
-        <p:nvSpPr>
-          <p:cNvPr id="3" name="Text Placeholder 2">
-            <a:extLst>
-              <a:ext uri="{FF2B5EF4-FFF2-40B4-BE49-F238E27FC236}">
-                <a16:creationId xmlns:a16="http://schemas.microsoft.com/office/drawing/2014/main" id="{29B23574-E1AE-5D4E-A92B-41CAD1AF7D5A}"/>
-              </a:ext>
-            </a:extLst>
-          </p:cNvPr>
-          <p:cNvSpPr>
-            <a:spLocks noGrp="1"/>
-          </p:cNvSpPr>
-          <p:nvPr>
-            <p:ph type="body" sz="quarter" idx="10"/>
-          </p:nvPr>
-        </p:nvSpPr>
-        <p:spPr/>
-        <p:txBody>
-          <a:bodyPr/>
-          <a:lstStyle/>
-          <a:p>
-            <a:r>
-              <a:rPr lang="en-US" dirty="0"/>
-              <a:t>2. Kriging</a:t>
-            </a:r>
-          </a:p>
-        </p:txBody>
-      </p:sp>
-      <p:sp>
-        <p:nvSpPr>
-          <p:cNvPr id="5" name="Rectangle 4">
-            <a:extLst>
-              <a:ext uri="{FF2B5EF4-FFF2-40B4-BE49-F238E27FC236}">
-                <a16:creationId xmlns:a16="http://schemas.microsoft.com/office/drawing/2014/main" id="{81DD6188-9C46-9248-B7A2-EC5E2D7BA323}"/>
-              </a:ext>
-            </a:extLst>
-          </p:cNvPr>
-          <p:cNvSpPr/>
-          <p:nvPr/>
-        </p:nvSpPr>
-        <p:spPr>
-          <a:xfrm>
-            <a:off x="539452" y="1553080"/>
-            <a:ext cx="8065095" cy="1815882"/>
-          </a:xfrm>
-          <a:prstGeom prst="rect">
-            <a:avLst/>
-          </a:prstGeom>
-        </p:spPr>
-        <p:txBody>
-          <a:bodyPr wrap="square">
-            <a:spAutoFit/>
-          </a:bodyPr>
-          <a:lstStyle/>
-          <a:p>
-            <a:r>
-              <a:rPr lang="en-US" b="1" dirty="0"/>
-              <a:t>Kriging</a:t>
-            </a:r>
-            <a:r>
-              <a:rPr lang="en-US" dirty="0"/>
-              <a:t> is a group of geostatistical techniques to interpolate the value of a random field at an un-sampled location from known observations of its value at nearby locations. </a:t>
-            </a:r>
-          </a:p>
-          <a:p>
-            <a:endParaRPr lang="en-US" dirty="0"/>
-          </a:p>
-          <a:p>
-            <a:r>
-              <a:rPr lang="en-US" dirty="0"/>
-              <a:t>The main statistical assumption behind kriging is one of </a:t>
-            </a:r>
-            <a:r>
-              <a:rPr lang="en-US" b="1" dirty="0"/>
-              <a:t>stationarity</a:t>
-            </a:r>
-            <a:r>
-              <a:rPr lang="en-US" dirty="0"/>
-              <a:t> which means that statistical properties (such as </a:t>
-            </a:r>
-            <a:r>
-              <a:rPr lang="en-US" b="1" dirty="0"/>
-              <a:t>mean and variance</a:t>
-            </a:r>
-            <a:r>
-              <a:rPr lang="en-US" dirty="0"/>
-              <a:t>) do not depend on the exact spatial locations, so the mean and variance of a variable at one location is equal to the mean and variance at another location. </a:t>
-            </a:r>
-          </a:p>
-          <a:p>
-            <a:br>
-              <a:rPr lang="en-US" dirty="0"/>
-            </a:br>
-            <a:endParaRPr lang="en-US" dirty="0">
-              <a:effectLst/>
-            </a:endParaRPr>
-          </a:p>
-        </p:txBody>
-      </p:sp>
-    </p:spTree>
-    <p:extLst>
-      <p:ext uri="{BB962C8B-B14F-4D97-AF65-F5344CB8AC3E}">
-        <p14:creationId xmlns:p14="http://schemas.microsoft.com/office/powerpoint/2010/main" val="3849745909"/>
       </p:ext>
     </p:extLst>
   </p:cSld>

</xml_diff>

<commit_message>
Add slides and repair path
</commit_message>
<xml_diff>
--- a/doc/BCB_Intro_Advanced_Analysis_1_2021.pptx
+++ b/doc/BCB_Intro_Advanced_Analysis_1_2021.pptx
@@ -6,7 +6,7 @@
     <p:sldMasterId id="2147483654" r:id="rId2"/>
   </p:sldMasterIdLst>
   <p:notesMasterIdLst>
-    <p:notesMasterId r:id="rId17"/>
+    <p:notesMasterId r:id="rId20"/>
   </p:notesMasterIdLst>
   <p:sldIdLst>
     <p:sldId id="335" r:id="rId3"/>
@@ -21,8 +21,11 @@
     <p:sldId id="447" r:id="rId12"/>
     <p:sldId id="448" r:id="rId13"/>
     <p:sldId id="449" r:id="rId14"/>
-    <p:sldId id="450" r:id="rId15"/>
-    <p:sldId id="454" r:id="rId16"/>
+    <p:sldId id="455" r:id="rId15"/>
+    <p:sldId id="450" r:id="rId16"/>
+    <p:sldId id="456" r:id="rId17"/>
+    <p:sldId id="457" r:id="rId18"/>
+    <p:sldId id="454" r:id="rId19"/>
   </p:sldIdLst>
   <p:sldSz cx="9144000" cy="5143500" type="screen16x9"/>
   <p:notesSz cx="6858000" cy="9144000"/>
@@ -232,7 +235,7 @@
           <a:p>
             <a:fld id="{8B3D4395-F4BB-4776-AD1A-E1F7520CF444}" type="datetimeFigureOut">
               <a:rPr lang="en-US" smtClean="0"/>
-              <a:t>4/25/21</a:t>
+              <a:t>4/27/2021</a:t>
             </a:fld>
             <a:endParaRPr lang="en-US" dirty="0"/>
           </a:p>
@@ -983,6 +986,258 @@
     <p:extLst>
       <p:ext uri="{BB962C8B-B14F-4D97-AF65-F5344CB8AC3E}">
         <p14:creationId xmlns:p14="http://schemas.microsoft.com/office/powerpoint/2010/main" val="2323891030"/>
+      </p:ext>
+    </p:extLst>
+  </p:cSld>
+  <p:clrMapOvr>
+    <a:masterClrMapping/>
+  </p:clrMapOvr>
+</p:notes>
+</file>
+
+<file path=ppt/notesSlides/notesSlide5.xml><?xml version="1.0" encoding="utf-8"?>
+<p:notes xmlns:a="http://schemas.openxmlformats.org/drawingml/2006/main" xmlns:r="http://schemas.openxmlformats.org/officeDocument/2006/relationships" xmlns:p="http://schemas.openxmlformats.org/presentationml/2006/main">
+  <p:cSld>
+    <p:spTree>
+      <p:nvGrpSpPr>
+        <p:cNvPr id="1" name=""/>
+        <p:cNvGrpSpPr/>
+        <p:nvPr/>
+      </p:nvGrpSpPr>
+      <p:grpSpPr>
+        <a:xfrm>
+          <a:off x="0" y="0"/>
+          <a:ext cx="0" cy="0"/>
+          <a:chOff x="0" y="0"/>
+          <a:chExt cx="0" cy="0"/>
+        </a:xfrm>
+      </p:grpSpPr>
+      <p:sp>
+        <p:nvSpPr>
+          <p:cNvPr id="2" name="Slide Image Placeholder 1"/>
+          <p:cNvSpPr>
+            <a:spLocks noGrp="1" noRot="1" noChangeAspect="1"/>
+          </p:cNvSpPr>
+          <p:nvPr>
+            <p:ph type="sldImg"/>
+          </p:nvPr>
+        </p:nvSpPr>
+        <p:spPr/>
+      </p:sp>
+      <p:sp>
+        <p:nvSpPr>
+          <p:cNvPr id="3" name="Notes Placeholder 2"/>
+          <p:cNvSpPr>
+            <a:spLocks noGrp="1"/>
+          </p:cNvSpPr>
+          <p:nvPr>
+            <p:ph type="body" idx="1"/>
+          </p:nvPr>
+        </p:nvSpPr>
+        <p:spPr/>
+        <p:txBody>
+          <a:bodyPr/>
+          <a:lstStyle/>
+          <a:p>
+            <a:endParaRPr lang="en-US" dirty="0"/>
+          </a:p>
+        </p:txBody>
+      </p:sp>
+      <p:sp>
+        <p:nvSpPr>
+          <p:cNvPr id="4" name="Slide Number Placeholder 3"/>
+          <p:cNvSpPr>
+            <a:spLocks noGrp="1"/>
+          </p:cNvSpPr>
+          <p:nvPr>
+            <p:ph type="sldNum" sz="quarter" idx="5"/>
+          </p:nvPr>
+        </p:nvSpPr>
+        <p:spPr/>
+        <p:txBody>
+          <a:bodyPr/>
+          <a:lstStyle/>
+          <a:p>
+            <a:fld id="{8B0993E8-77CB-4CE8-8134-9D98A3510F3A}" type="slidenum">
+              <a:rPr lang="en-US" smtClean="0"/>
+              <a:t>14</a:t>
+            </a:fld>
+            <a:endParaRPr lang="en-US" dirty="0"/>
+          </a:p>
+        </p:txBody>
+      </p:sp>
+    </p:spTree>
+    <p:extLst>
+      <p:ext uri="{BB962C8B-B14F-4D97-AF65-F5344CB8AC3E}">
+        <p14:creationId xmlns:p14="http://schemas.microsoft.com/office/powerpoint/2010/main" val="4219456944"/>
+      </p:ext>
+    </p:extLst>
+  </p:cSld>
+  <p:clrMapOvr>
+    <a:masterClrMapping/>
+  </p:clrMapOvr>
+</p:notes>
+</file>
+
+<file path=ppt/notesSlides/notesSlide6.xml><?xml version="1.0" encoding="utf-8"?>
+<p:notes xmlns:a="http://schemas.openxmlformats.org/drawingml/2006/main" xmlns:r="http://schemas.openxmlformats.org/officeDocument/2006/relationships" xmlns:p="http://schemas.openxmlformats.org/presentationml/2006/main">
+  <p:cSld>
+    <p:spTree>
+      <p:nvGrpSpPr>
+        <p:cNvPr id="1" name=""/>
+        <p:cNvGrpSpPr/>
+        <p:nvPr/>
+      </p:nvGrpSpPr>
+      <p:grpSpPr>
+        <a:xfrm>
+          <a:off x="0" y="0"/>
+          <a:ext cx="0" cy="0"/>
+          <a:chOff x="0" y="0"/>
+          <a:chExt cx="0" cy="0"/>
+        </a:xfrm>
+      </p:grpSpPr>
+      <p:sp>
+        <p:nvSpPr>
+          <p:cNvPr id="2" name="Slide Image Placeholder 1"/>
+          <p:cNvSpPr>
+            <a:spLocks noGrp="1" noRot="1" noChangeAspect="1"/>
+          </p:cNvSpPr>
+          <p:nvPr>
+            <p:ph type="sldImg"/>
+          </p:nvPr>
+        </p:nvSpPr>
+        <p:spPr/>
+      </p:sp>
+      <p:sp>
+        <p:nvSpPr>
+          <p:cNvPr id="3" name="Notes Placeholder 2"/>
+          <p:cNvSpPr>
+            <a:spLocks noGrp="1"/>
+          </p:cNvSpPr>
+          <p:nvPr>
+            <p:ph type="body" idx="1"/>
+          </p:nvPr>
+        </p:nvSpPr>
+        <p:spPr/>
+        <p:txBody>
+          <a:bodyPr/>
+          <a:lstStyle/>
+          <a:p>
+            <a:endParaRPr lang="en-US" dirty="0"/>
+          </a:p>
+        </p:txBody>
+      </p:sp>
+      <p:sp>
+        <p:nvSpPr>
+          <p:cNvPr id="4" name="Slide Number Placeholder 3"/>
+          <p:cNvSpPr>
+            <a:spLocks noGrp="1"/>
+          </p:cNvSpPr>
+          <p:nvPr>
+            <p:ph type="sldNum" sz="quarter" idx="5"/>
+          </p:nvPr>
+        </p:nvSpPr>
+        <p:spPr/>
+        <p:txBody>
+          <a:bodyPr/>
+          <a:lstStyle/>
+          <a:p>
+            <a:fld id="{8B0993E8-77CB-4CE8-8134-9D98A3510F3A}" type="slidenum">
+              <a:rPr lang="en-US" smtClean="0"/>
+              <a:t>15</a:t>
+            </a:fld>
+            <a:endParaRPr lang="en-US" dirty="0"/>
+          </a:p>
+        </p:txBody>
+      </p:sp>
+    </p:spTree>
+    <p:extLst>
+      <p:ext uri="{BB962C8B-B14F-4D97-AF65-F5344CB8AC3E}">
+        <p14:creationId xmlns:p14="http://schemas.microsoft.com/office/powerpoint/2010/main" val="871950714"/>
+      </p:ext>
+    </p:extLst>
+  </p:cSld>
+  <p:clrMapOvr>
+    <a:masterClrMapping/>
+  </p:clrMapOvr>
+</p:notes>
+</file>
+
+<file path=ppt/notesSlides/notesSlide7.xml><?xml version="1.0" encoding="utf-8"?>
+<p:notes xmlns:a="http://schemas.openxmlformats.org/drawingml/2006/main" xmlns:r="http://schemas.openxmlformats.org/officeDocument/2006/relationships" xmlns:p="http://schemas.openxmlformats.org/presentationml/2006/main">
+  <p:cSld>
+    <p:spTree>
+      <p:nvGrpSpPr>
+        <p:cNvPr id="1" name=""/>
+        <p:cNvGrpSpPr/>
+        <p:nvPr/>
+      </p:nvGrpSpPr>
+      <p:grpSpPr>
+        <a:xfrm>
+          <a:off x="0" y="0"/>
+          <a:ext cx="0" cy="0"/>
+          <a:chOff x="0" y="0"/>
+          <a:chExt cx="0" cy="0"/>
+        </a:xfrm>
+      </p:grpSpPr>
+      <p:sp>
+        <p:nvSpPr>
+          <p:cNvPr id="2" name="Slide Image Placeholder 1"/>
+          <p:cNvSpPr>
+            <a:spLocks noGrp="1" noRot="1" noChangeAspect="1"/>
+          </p:cNvSpPr>
+          <p:nvPr>
+            <p:ph type="sldImg"/>
+          </p:nvPr>
+        </p:nvSpPr>
+        <p:spPr/>
+      </p:sp>
+      <p:sp>
+        <p:nvSpPr>
+          <p:cNvPr id="3" name="Notes Placeholder 2"/>
+          <p:cNvSpPr>
+            <a:spLocks noGrp="1"/>
+          </p:cNvSpPr>
+          <p:nvPr>
+            <p:ph type="body" idx="1"/>
+          </p:nvPr>
+        </p:nvSpPr>
+        <p:spPr/>
+        <p:txBody>
+          <a:bodyPr/>
+          <a:lstStyle/>
+          <a:p>
+            <a:endParaRPr lang="en-US" dirty="0"/>
+          </a:p>
+        </p:txBody>
+      </p:sp>
+      <p:sp>
+        <p:nvSpPr>
+          <p:cNvPr id="4" name="Slide Number Placeholder 3"/>
+          <p:cNvSpPr>
+            <a:spLocks noGrp="1"/>
+          </p:cNvSpPr>
+          <p:nvPr>
+            <p:ph type="sldNum" sz="quarter" idx="5"/>
+          </p:nvPr>
+        </p:nvSpPr>
+        <p:spPr/>
+        <p:txBody>
+          <a:bodyPr/>
+          <a:lstStyle/>
+          <a:p>
+            <a:fld id="{8B0993E8-77CB-4CE8-8134-9D98A3510F3A}" type="slidenum">
+              <a:rPr lang="en-US" smtClean="0"/>
+              <a:t>16</a:t>
+            </a:fld>
+            <a:endParaRPr lang="en-US" dirty="0"/>
+          </a:p>
+        </p:txBody>
+      </p:sp>
+    </p:spTree>
+    <p:extLst>
+      <p:ext uri="{BB962C8B-B14F-4D97-AF65-F5344CB8AC3E}">
+        <p14:creationId xmlns:p14="http://schemas.microsoft.com/office/powerpoint/2010/main" val="3816614623"/>
       </p:ext>
     </p:extLst>
   </p:cSld>
@@ -3722,7 +3977,7 @@
     </p:spTree>
     <p:extLst>
       <p:ext uri="{BB962C8B-B14F-4D97-AF65-F5344CB8AC3E}">
-        <p14:creationId xmlns:p14="http://schemas.microsoft.com/office/powerpoint/2010/main" val="2755801055"/>
+        <p14:creationId xmlns:p14="http://schemas.microsoft.com/office/powerpoint/2010/main" val="1405928685"/>
       </p:ext>
     </p:extLst>
   </p:cSld>
@@ -3754,6 +4009,1074 @@
           <p:cNvPr id="2" name="Title 1">
             <a:extLst>
               <a:ext uri="{FF2B5EF4-FFF2-40B4-BE49-F238E27FC236}">
+                <a16:creationId xmlns:a16="http://schemas.microsoft.com/office/drawing/2014/main" id="{AE921CF8-FF22-4247-8824-870CB296EE58}"/>
+              </a:ext>
+            </a:extLst>
+          </p:cNvPr>
+          <p:cNvSpPr>
+            <a:spLocks noGrp="1"/>
+          </p:cNvSpPr>
+          <p:nvPr>
+            <p:ph type="title"/>
+          </p:nvPr>
+        </p:nvSpPr>
+        <p:spPr/>
+        <p:txBody>
+          <a:bodyPr/>
+          <a:lstStyle/>
+          <a:p>
+            <a:r>
+              <a:rPr lang="en-US" dirty="0"/>
+              <a:t>Geo Weighted Regression</a:t>
+            </a:r>
+          </a:p>
+        </p:txBody>
+      </p:sp>
+      <p:sp>
+        <p:nvSpPr>
+          <p:cNvPr id="3" name="Text Placeholder 2">
+            <a:extLst>
+              <a:ext uri="{FF2B5EF4-FFF2-40B4-BE49-F238E27FC236}">
+                <a16:creationId xmlns:a16="http://schemas.microsoft.com/office/drawing/2014/main" id="{B25F14D8-9C39-FC42-8F7D-BEE528235EDA}"/>
+              </a:ext>
+            </a:extLst>
+          </p:cNvPr>
+          <p:cNvSpPr>
+            <a:spLocks noGrp="1"/>
+          </p:cNvSpPr>
+          <p:nvPr>
+            <p:ph type="body" sz="quarter" idx="10"/>
+          </p:nvPr>
+        </p:nvSpPr>
+        <p:spPr>
+          <a:xfrm>
+            <a:off x="337760" y="292626"/>
+            <a:ext cx="4234240" cy="279834"/>
+          </a:xfrm>
+        </p:spPr>
+        <p:txBody>
+          <a:bodyPr/>
+          <a:lstStyle/>
+          <a:p>
+            <a:r>
+              <a:rPr lang="en-US" dirty="0"/>
+              <a:t>3. Geographically Weighted Regression</a:t>
+            </a:r>
+          </a:p>
+        </p:txBody>
+      </p:sp>
+      <mc:AlternateContent xmlns:mc="http://schemas.openxmlformats.org/markup-compatibility/2006">
+        <mc:Choice xmlns:a14="http://schemas.microsoft.com/office/drawing/2010/main" Requires="a14">
+          <p:sp>
+            <p:nvSpPr>
+              <p:cNvPr id="5" name="Rectangle 4">
+                <a:extLst>
+                  <a:ext uri="{FF2B5EF4-FFF2-40B4-BE49-F238E27FC236}">
+                    <a16:creationId xmlns:a16="http://schemas.microsoft.com/office/drawing/2014/main" id="{2212D99A-8E49-884F-9050-B055DF84C908}"/>
+                  </a:ext>
+                </a:extLst>
+              </p:cNvPr>
+              <p:cNvSpPr/>
+              <p:nvPr/>
+            </p:nvSpPr>
+            <p:spPr>
+              <a:xfrm>
+                <a:off x="337760" y="1232922"/>
+                <a:ext cx="8517482" cy="2554545"/>
+              </a:xfrm>
+              <a:prstGeom prst="rect">
+                <a:avLst/>
+              </a:prstGeom>
+            </p:spPr>
+            <p:txBody>
+              <a:bodyPr wrap="square">
+                <a:spAutoFit/>
+              </a:bodyPr>
+              <a:lstStyle/>
+              <a:p>
+                <a:r>
+                  <a:rPr lang="en-US" sz="1600" dirty="0">
+                    <a:solidFill>
+                      <a:srgbClr val="333333"/>
+                    </a:solidFill>
+                    <a:latin typeface="Source Sans Pro" panose="020B0503030403020204" pitchFamily="34" charset="0"/>
+                  </a:rPr>
+                  <a:t>The traditional regressions like ordinary least square (OLS) tend to ignore the spatial dependence:</a:t>
+                </a:r>
+              </a:p>
+              <a:p>
+                <a:endParaRPr lang="en-US" sz="1600" b="0" i="1" dirty="0">
+                  <a:solidFill>
+                    <a:srgbClr val="333333"/>
+                  </a:solidFill>
+                  <a:latin typeface="Cambria Math" panose="02040503050406030204" pitchFamily="18" charset="0"/>
+                </a:endParaRPr>
+              </a:p>
+              <a:p>
+                <a14:m>
+                  <m:oMathPara xmlns:m="http://schemas.openxmlformats.org/officeDocument/2006/math">
+                    <m:oMathParaPr>
+                      <m:jc m:val="centerGroup"/>
+                    </m:oMathParaPr>
+                    <m:oMath xmlns:m="http://schemas.openxmlformats.org/officeDocument/2006/math">
+                      <m:r>
+                        <a:rPr lang="en-US" sz="1600" b="0" i="1" smtClean="0">
+                          <a:solidFill>
+                            <a:srgbClr val="333333"/>
+                          </a:solidFill>
+                          <a:latin typeface="Cambria Math" panose="02040503050406030204" pitchFamily="18" charset="0"/>
+                        </a:rPr>
+                        <m:t>𝑦</m:t>
+                      </m:r>
+                      <m:r>
+                        <a:rPr lang="en-US" sz="1600" b="0" i="1" smtClean="0">
+                          <a:solidFill>
+                            <a:srgbClr val="333333"/>
+                          </a:solidFill>
+                          <a:latin typeface="Cambria Math" panose="02040503050406030204" pitchFamily="18" charset="0"/>
+                        </a:rPr>
+                        <m:t>=</m:t>
+                      </m:r>
+                      <m:r>
+                        <a:rPr lang="en-US" sz="1600" b="0" i="1" smtClean="0">
+                          <a:solidFill>
+                            <a:srgbClr val="333333"/>
+                          </a:solidFill>
+                          <a:latin typeface="Cambria Math" panose="02040503050406030204" pitchFamily="18" charset="0"/>
+                        </a:rPr>
+                        <m:t>𝑋</m:t>
+                      </m:r>
+                      <m:r>
+                        <a:rPr lang="en-US" sz="1600" b="0" i="1" smtClean="0">
+                          <a:solidFill>
+                            <a:srgbClr val="333333"/>
+                          </a:solidFill>
+                          <a:latin typeface="Cambria Math" panose="02040503050406030204" pitchFamily="18" charset="0"/>
+                        </a:rPr>
+                        <m:t>𝛽</m:t>
+                      </m:r>
+                      <m:r>
+                        <a:rPr lang="en-US" sz="1600" b="0" i="1" smtClean="0">
+                          <a:solidFill>
+                            <a:srgbClr val="333333"/>
+                          </a:solidFill>
+                          <a:latin typeface="Cambria Math" panose="02040503050406030204" pitchFamily="18" charset="0"/>
+                        </a:rPr>
+                        <m:t>+</m:t>
+                      </m:r>
+                      <m:r>
+                        <a:rPr lang="en-US" sz="1600" b="0" i="1" smtClean="0">
+                          <a:solidFill>
+                            <a:srgbClr val="333333"/>
+                          </a:solidFill>
+                          <a:latin typeface="Cambria Math" panose="02040503050406030204" pitchFamily="18" charset="0"/>
+                        </a:rPr>
+                        <m:t>𝜖</m:t>
+                      </m:r>
+                    </m:oMath>
+                  </m:oMathPara>
+                </a14:m>
+                <a:endParaRPr lang="en-US" sz="1600" dirty="0">
+                  <a:solidFill>
+                    <a:srgbClr val="333333"/>
+                  </a:solidFill>
+                  <a:latin typeface="Source Sans Pro" panose="020B0503030403020204" pitchFamily="34" charset="0"/>
+                </a:endParaRPr>
+              </a:p>
+              <a:p>
+                <a:br>
+                  <a:rPr lang="en-US" sz="1600" dirty="0"/>
+                </a:br>
+                <a:r>
+                  <a:rPr lang="en-US" sz="1600" dirty="0"/>
+                  <a:t>The estimates may be:</a:t>
+                </a:r>
+              </a:p>
+              <a:p>
+                <a:pPr marL="628650" lvl="1" indent="-285750">
+                  <a:buFont typeface="Arial" panose="020B0604020202020204" pitchFamily="34" charset="0"/>
+                  <a:buChar char="•"/>
+                </a:pPr>
+                <a:r>
+                  <a:rPr lang="en-US" sz="1600" dirty="0"/>
+                  <a:t>Biased (expectation of estimates not equals to the true parameter)</a:t>
+                </a:r>
+              </a:p>
+              <a:p>
+                <a:pPr marL="628650" lvl="1" indent="-285750">
+                  <a:buFont typeface="Arial" panose="020B0604020202020204" pitchFamily="34" charset="0"/>
+                  <a:buChar char="•"/>
+                </a:pPr>
+                <a:r>
+                  <a:rPr lang="en-US" sz="1600" dirty="0"/>
+                  <a:t>Inconsistent (estimates not converging to the true parameters as data points increases)</a:t>
+                </a:r>
+              </a:p>
+              <a:p>
+                <a:pPr marL="628650" lvl="1" indent="-285750">
+                  <a:buFont typeface="Arial" panose="020B0604020202020204" pitchFamily="34" charset="0"/>
+                  <a:buChar char="•"/>
+                </a:pPr>
+                <a:r>
+                  <a:rPr lang="en-US" sz="1600" dirty="0"/>
+                  <a:t>Inefficient (variance of estimator not to the minimum)</a:t>
+                </a:r>
+              </a:p>
+              <a:p>
+                <a:pPr marL="628650" lvl="1" indent="-285750">
+                  <a:buFont typeface="Arial" panose="020B0604020202020204" pitchFamily="34" charset="0"/>
+                  <a:buChar char="•"/>
+                </a:pPr>
+                <a:endParaRPr lang="en-US" sz="1600" dirty="0"/>
+              </a:p>
+              <a:p>
+                <a:r>
+                  <a:rPr lang="en-US" sz="1600" dirty="0"/>
+                  <a:t>It could be diagnosed that the dependent variable and/or the error term are spatially autocorrelated.</a:t>
+                </a:r>
+              </a:p>
+            </p:txBody>
+          </p:sp>
+        </mc:Choice>
+        <mc:Fallback>
+          <p:sp>
+            <p:nvSpPr>
+              <p:cNvPr id="5" name="Rectangle 4">
+                <a:extLst>
+                  <a:ext uri="{FF2B5EF4-FFF2-40B4-BE49-F238E27FC236}">
+                    <a16:creationId xmlns:a16="http://schemas.microsoft.com/office/drawing/2014/main" id="{2212D99A-8E49-884F-9050-B055DF84C908}"/>
+                  </a:ext>
+                </a:extLst>
+              </p:cNvPr>
+              <p:cNvSpPr>
+                <a:spLocks noRot="1" noChangeAspect="1" noMove="1" noResize="1" noEditPoints="1" noAdjustHandles="1" noChangeArrowheads="1" noChangeShapeType="1" noTextEdit="1"/>
+              </p:cNvSpPr>
+              <p:nvPr/>
+            </p:nvSpPr>
+            <p:spPr>
+              <a:xfrm>
+                <a:off x="337760" y="1232922"/>
+                <a:ext cx="8517482" cy="2554545"/>
+              </a:xfrm>
+              <a:prstGeom prst="rect">
+                <a:avLst/>
+              </a:prstGeom>
+              <a:blipFill>
+                <a:blip r:embed="rId3"/>
+                <a:stretch>
+                  <a:fillRect l="-358" t="-716" r="-143" b="-2148"/>
+                </a:stretch>
+              </a:blipFill>
+            </p:spPr>
+            <p:txBody>
+              <a:bodyPr/>
+              <a:lstStyle/>
+              <a:p>
+                <a:r>
+                  <a:rPr lang="en-US">
+                    <a:noFill/>
+                  </a:rPr>
+                  <a:t> </a:t>
+                </a:r>
+              </a:p>
+            </p:txBody>
+          </p:sp>
+        </mc:Fallback>
+      </mc:AlternateContent>
+    </p:spTree>
+    <p:extLst>
+      <p:ext uri="{BB962C8B-B14F-4D97-AF65-F5344CB8AC3E}">
+        <p14:creationId xmlns:p14="http://schemas.microsoft.com/office/powerpoint/2010/main" val="2755801055"/>
+      </p:ext>
+    </p:extLst>
+  </p:cSld>
+  <p:clrMapOvr>
+    <a:masterClrMapping/>
+  </p:clrMapOvr>
+</p:sld>
+</file>
+
+<file path=ppt/slides/slide15.xml><?xml version="1.0" encoding="utf-8"?>
+<p:sld xmlns:a="http://schemas.openxmlformats.org/drawingml/2006/main" xmlns:r="http://schemas.openxmlformats.org/officeDocument/2006/relationships" xmlns:p="http://schemas.openxmlformats.org/presentationml/2006/main">
+  <p:cSld>
+    <p:spTree>
+      <p:nvGrpSpPr>
+        <p:cNvPr id="1" name=""/>
+        <p:cNvGrpSpPr/>
+        <p:nvPr/>
+      </p:nvGrpSpPr>
+      <p:grpSpPr>
+        <a:xfrm>
+          <a:off x="0" y="0"/>
+          <a:ext cx="0" cy="0"/>
+          <a:chOff x="0" y="0"/>
+          <a:chExt cx="0" cy="0"/>
+        </a:xfrm>
+      </p:grpSpPr>
+      <p:sp>
+        <p:nvSpPr>
+          <p:cNvPr id="2" name="Title 1">
+            <a:extLst>
+              <a:ext uri="{FF2B5EF4-FFF2-40B4-BE49-F238E27FC236}">
+                <a16:creationId xmlns:a16="http://schemas.microsoft.com/office/drawing/2014/main" id="{AE921CF8-FF22-4247-8824-870CB296EE58}"/>
+              </a:ext>
+            </a:extLst>
+          </p:cNvPr>
+          <p:cNvSpPr>
+            <a:spLocks noGrp="1"/>
+          </p:cNvSpPr>
+          <p:nvPr>
+            <p:ph type="title"/>
+          </p:nvPr>
+        </p:nvSpPr>
+        <p:spPr/>
+        <p:txBody>
+          <a:bodyPr/>
+          <a:lstStyle/>
+          <a:p>
+            <a:r>
+              <a:rPr lang="en-US" dirty="0"/>
+              <a:t>Geo Weighted Regression</a:t>
+            </a:r>
+          </a:p>
+        </p:txBody>
+      </p:sp>
+      <p:sp>
+        <p:nvSpPr>
+          <p:cNvPr id="3" name="Text Placeholder 2">
+            <a:extLst>
+              <a:ext uri="{FF2B5EF4-FFF2-40B4-BE49-F238E27FC236}">
+                <a16:creationId xmlns:a16="http://schemas.microsoft.com/office/drawing/2014/main" id="{B25F14D8-9C39-FC42-8F7D-BEE528235EDA}"/>
+              </a:ext>
+            </a:extLst>
+          </p:cNvPr>
+          <p:cNvSpPr>
+            <a:spLocks noGrp="1"/>
+          </p:cNvSpPr>
+          <p:nvPr>
+            <p:ph type="body" sz="quarter" idx="10"/>
+          </p:nvPr>
+        </p:nvSpPr>
+        <p:spPr>
+          <a:xfrm>
+            <a:off x="337760" y="292626"/>
+            <a:ext cx="4234240" cy="279834"/>
+          </a:xfrm>
+        </p:spPr>
+        <p:txBody>
+          <a:bodyPr/>
+          <a:lstStyle/>
+          <a:p>
+            <a:r>
+              <a:rPr lang="en-US" dirty="0"/>
+              <a:t>3. Geographically Weighted Regression</a:t>
+            </a:r>
+          </a:p>
+        </p:txBody>
+      </p:sp>
+      <mc:AlternateContent xmlns:mc="http://schemas.openxmlformats.org/markup-compatibility/2006">
+        <mc:Choice xmlns:a14="http://schemas.microsoft.com/office/drawing/2010/main" Requires="a14">
+          <p:sp>
+            <p:nvSpPr>
+              <p:cNvPr id="5" name="Rectangle 4">
+                <a:extLst>
+                  <a:ext uri="{FF2B5EF4-FFF2-40B4-BE49-F238E27FC236}">
+                    <a16:creationId xmlns:a16="http://schemas.microsoft.com/office/drawing/2014/main" id="{2212D99A-8E49-884F-9050-B055DF84C908}"/>
+                  </a:ext>
+                </a:extLst>
+              </p:cNvPr>
+              <p:cNvSpPr/>
+              <p:nvPr/>
+            </p:nvSpPr>
+            <p:spPr>
+              <a:xfrm>
+                <a:off x="337760" y="1232922"/>
+                <a:ext cx="8517482" cy="2594172"/>
+              </a:xfrm>
+              <a:prstGeom prst="rect">
+                <a:avLst/>
+              </a:prstGeom>
+            </p:spPr>
+            <p:txBody>
+              <a:bodyPr wrap="square">
+                <a:spAutoFit/>
+              </a:bodyPr>
+              <a:lstStyle/>
+              <a:p>
+                <a:r>
+                  <a:rPr lang="en-US" sz="1600" dirty="0">
+                    <a:solidFill>
+                      <a:srgbClr val="333333"/>
+                    </a:solidFill>
+                    <a:latin typeface="Source Sans Pro" panose="020B0503030403020204" pitchFamily="34" charset="0"/>
+                  </a:rPr>
+                  <a:t>There are two general forms in which spatial autocorrelation enters the regression equation: the spatial lag form and the spatial error form (also called the spatial moving average form).</a:t>
+                </a:r>
+              </a:p>
+              <a:p>
+                <a:endParaRPr lang="en-US" sz="1600" dirty="0">
+                  <a:solidFill>
+                    <a:srgbClr val="333333"/>
+                  </a:solidFill>
+                  <a:latin typeface="Source Sans Pro" panose="020B0503030403020204" pitchFamily="34" charset="0"/>
+                </a:endParaRPr>
+              </a:p>
+              <a:p>
+                <a:r>
+                  <a:rPr lang="en-US" sz="1600" dirty="0">
+                    <a:solidFill>
+                      <a:srgbClr val="333333"/>
+                    </a:solidFill>
+                    <a:latin typeface="Source Sans Pro" panose="020B0503030403020204" pitchFamily="34" charset="0"/>
+                  </a:rPr>
+                  <a:t>Spatial Lag Model:</a:t>
+                </a:r>
+              </a:p>
+              <a:p>
+                <a:endParaRPr lang="en-US" sz="1600" dirty="0">
+                  <a:solidFill>
+                    <a:srgbClr val="333333"/>
+                  </a:solidFill>
+                  <a:latin typeface="Source Sans Pro" panose="020B0503030403020204" pitchFamily="34" charset="0"/>
+                </a:endParaRPr>
+              </a:p>
+              <a:p>
+                <a14:m>
+                  <m:oMathPara xmlns:m="http://schemas.openxmlformats.org/officeDocument/2006/math">
+                    <m:oMathParaPr>
+                      <m:jc m:val="centerGroup"/>
+                    </m:oMathParaPr>
+                    <m:oMath xmlns:m="http://schemas.openxmlformats.org/officeDocument/2006/math">
+                      <m:r>
+                        <a:rPr lang="en-US" sz="1600" b="0" i="1" smtClean="0">
+                          <a:latin typeface="Cambria Math" panose="02040503050406030204" pitchFamily="18" charset="0"/>
+                        </a:rPr>
+                        <m:t>𝑦</m:t>
+                      </m:r>
+                      <m:r>
+                        <a:rPr lang="en-US" sz="1600" b="0" i="1" smtClean="0">
+                          <a:latin typeface="Cambria Math" panose="02040503050406030204" pitchFamily="18" charset="0"/>
+                        </a:rPr>
+                        <m:t>=</m:t>
+                      </m:r>
+                      <m:r>
+                        <a:rPr lang="en-US" sz="1600" b="0" i="1" smtClean="0">
+                          <a:latin typeface="Cambria Math" panose="02040503050406030204" pitchFamily="18" charset="0"/>
+                        </a:rPr>
+                        <m:t>𝑋</m:t>
+                      </m:r>
+                      <m:r>
+                        <a:rPr lang="en-US" sz="1600" b="0" i="1" smtClean="0">
+                          <a:latin typeface="Cambria Math" panose="02040503050406030204" pitchFamily="18" charset="0"/>
+                        </a:rPr>
+                        <m:t>𝛽</m:t>
+                      </m:r>
+                      <m:r>
+                        <a:rPr lang="en-US" sz="1600" b="0" i="1" smtClean="0">
+                          <a:latin typeface="Cambria Math" panose="02040503050406030204" pitchFamily="18" charset="0"/>
+                        </a:rPr>
+                        <m:t>+</m:t>
+                      </m:r>
+                      <m:r>
+                        <a:rPr lang="en-US" sz="1600" b="0" i="1" smtClean="0">
+                          <a:latin typeface="Cambria Math" panose="02040503050406030204" pitchFamily="18" charset="0"/>
+                        </a:rPr>
+                        <m:t>𝜌</m:t>
+                      </m:r>
+                      <m:r>
+                        <a:rPr lang="en-US" sz="1600" b="0" i="1" smtClean="0">
+                          <a:latin typeface="Cambria Math" panose="02040503050406030204" pitchFamily="18" charset="0"/>
+                        </a:rPr>
+                        <m:t>𝑊𝑦</m:t>
+                      </m:r>
+                      <m:r>
+                        <a:rPr lang="en-US" sz="1600" b="0" i="1" smtClean="0">
+                          <a:latin typeface="Cambria Math" panose="02040503050406030204" pitchFamily="18" charset="0"/>
+                        </a:rPr>
+                        <m:t>+</m:t>
+                      </m:r>
+                      <m:r>
+                        <a:rPr lang="en-US" sz="1600" b="0" i="1" smtClean="0">
+                          <a:latin typeface="Cambria Math" panose="02040503050406030204" pitchFamily="18" charset="0"/>
+                        </a:rPr>
+                        <m:t>𝜖</m:t>
+                      </m:r>
+                    </m:oMath>
+                  </m:oMathPara>
+                </a14:m>
+                <a:endParaRPr lang="en-US" sz="1600" b="0" dirty="0"/>
+              </a:p>
+              <a:p>
+                <a:endParaRPr lang="en-US" sz="1600" dirty="0"/>
+              </a:p>
+              <a:p>
+                <a:r>
+                  <a:rPr lang="en-US" sz="1600" dirty="0"/>
+                  <a:t>Where </a:t>
+                </a:r>
+                <a14:m>
+                  <m:oMath xmlns:m="http://schemas.openxmlformats.org/officeDocument/2006/math">
+                    <m:r>
+                      <a:rPr lang="en-US" sz="1600" b="0" i="1" smtClean="0">
+                        <a:latin typeface="Cambria Math" panose="02040503050406030204" pitchFamily="18" charset="0"/>
+                      </a:rPr>
+                      <m:t>𝑊</m:t>
+                    </m:r>
+                  </m:oMath>
+                </a14:m>
+                <a:r>
+                  <a:rPr lang="en-US" sz="1600" dirty="0"/>
+                  <a:t> is a spatial weights matrix with elements </a:t>
+                </a:r>
+                <a14:m>
+                  <m:oMath xmlns:m="http://schemas.openxmlformats.org/officeDocument/2006/math">
+                    <m:sSub>
+                      <m:sSubPr>
+                        <m:ctrlPr>
+                          <a:rPr lang="en-US" sz="1600" b="0" i="1" smtClean="0">
+                            <a:latin typeface="Cambria Math" panose="02040503050406030204" pitchFamily="18" charset="0"/>
+                          </a:rPr>
+                        </m:ctrlPr>
+                      </m:sSubPr>
+                      <m:e>
+                        <m:r>
+                          <a:rPr lang="en-US" sz="1600" b="0" i="1" smtClean="0">
+                            <a:latin typeface="Cambria Math" panose="02040503050406030204" pitchFamily="18" charset="0"/>
+                          </a:rPr>
+                          <m:t>𝑤</m:t>
+                        </m:r>
+                      </m:e>
+                      <m:sub>
+                        <m:r>
+                          <a:rPr lang="en-US" sz="1600" b="0" i="1" smtClean="0">
+                            <a:latin typeface="Cambria Math" panose="02040503050406030204" pitchFamily="18" charset="0"/>
+                          </a:rPr>
+                          <m:t>𝑖𝑗</m:t>
+                        </m:r>
+                      </m:sub>
+                    </m:sSub>
+                    <m:r>
+                      <a:rPr lang="en-US" sz="1600" b="0" i="1" smtClean="0">
+                        <a:latin typeface="Cambria Math" panose="02040503050406030204" pitchFamily="18" charset="0"/>
+                      </a:rPr>
+                      <m:t>=1</m:t>
+                    </m:r>
+                  </m:oMath>
+                </a14:m>
+                <a:r>
+                  <a:rPr lang="en-US" sz="1600" dirty="0"/>
+                  <a:t> indicating spatial units </a:t>
+                </a:r>
+                <a14:m>
+                  <m:oMath xmlns:m="http://schemas.openxmlformats.org/officeDocument/2006/math">
+                    <m:r>
+                      <a:rPr lang="en-US" sz="1600" b="0" i="1" smtClean="0">
+                        <a:latin typeface="Cambria Math" panose="02040503050406030204" pitchFamily="18" charset="0"/>
+                      </a:rPr>
+                      <m:t>𝑖</m:t>
+                    </m:r>
+                  </m:oMath>
+                </a14:m>
+                <a:r>
+                  <a:rPr lang="en-US" sz="1600" dirty="0"/>
+                  <a:t> and </a:t>
+                </a:r>
+                <a14:m>
+                  <m:oMath xmlns:m="http://schemas.openxmlformats.org/officeDocument/2006/math">
+                    <m:r>
+                      <a:rPr lang="en-US" sz="1600" b="0" i="1" smtClean="0">
+                        <a:latin typeface="Cambria Math" panose="02040503050406030204" pitchFamily="18" charset="0"/>
+                      </a:rPr>
+                      <m:t>𝑗</m:t>
+                    </m:r>
+                  </m:oMath>
+                </a14:m>
+                <a:r>
+                  <a:rPr lang="en-US" sz="1600" dirty="0"/>
+                  <a:t> are neighbors and </a:t>
+                </a:r>
+                <a14:m>
+                  <m:oMath xmlns:m="http://schemas.openxmlformats.org/officeDocument/2006/math">
+                    <m:sSub>
+                      <m:sSubPr>
+                        <m:ctrlPr>
+                          <a:rPr lang="en-US" sz="1600" b="0" i="1" smtClean="0">
+                            <a:latin typeface="Cambria Math" panose="02040503050406030204" pitchFamily="18" charset="0"/>
+                          </a:rPr>
+                        </m:ctrlPr>
+                      </m:sSubPr>
+                      <m:e>
+                        <m:r>
+                          <a:rPr lang="en-US" sz="1600" b="0" i="1" smtClean="0">
+                            <a:latin typeface="Cambria Math" panose="02040503050406030204" pitchFamily="18" charset="0"/>
+                          </a:rPr>
+                          <m:t>𝑤</m:t>
+                        </m:r>
+                      </m:e>
+                      <m:sub>
+                        <m:r>
+                          <a:rPr lang="en-US" sz="1600" b="0" i="1" smtClean="0">
+                            <a:latin typeface="Cambria Math" panose="02040503050406030204" pitchFamily="18" charset="0"/>
+                          </a:rPr>
+                          <m:t>𝑖𝑗</m:t>
+                        </m:r>
+                      </m:sub>
+                    </m:sSub>
+                    <m:r>
+                      <a:rPr lang="en-US" sz="1600" b="0" i="1" smtClean="0">
+                        <a:latin typeface="Cambria Math" panose="02040503050406030204" pitchFamily="18" charset="0"/>
+                      </a:rPr>
+                      <m:t>=0</m:t>
+                    </m:r>
+                  </m:oMath>
+                </a14:m>
+                <a:r>
+                  <a:rPr lang="en-US" sz="1600" dirty="0"/>
+                  <a:t> otherwise, </a:t>
+                </a:r>
+                <a14:m>
+                  <m:oMath xmlns:m="http://schemas.openxmlformats.org/officeDocument/2006/math">
+                    <m:r>
+                      <a:rPr lang="en-US" sz="1600" b="0" i="1" smtClean="0">
+                        <a:latin typeface="Cambria Math" panose="02040503050406030204" pitchFamily="18" charset="0"/>
+                      </a:rPr>
+                      <m:t>𝜌</m:t>
+                    </m:r>
+                  </m:oMath>
+                </a14:m>
+                <a:r>
+                  <a:rPr lang="en-US" sz="1600" dirty="0"/>
+                  <a:t> is the partial regression coefficient for the spatial lag variable. Maximum likelihood estimation is employed to produce estimates. </a:t>
+                </a:r>
+              </a:p>
+            </p:txBody>
+          </p:sp>
+        </mc:Choice>
+        <mc:Fallback>
+          <p:sp>
+            <p:nvSpPr>
+              <p:cNvPr id="5" name="Rectangle 4">
+                <a:extLst>
+                  <a:ext uri="{FF2B5EF4-FFF2-40B4-BE49-F238E27FC236}">
+                    <a16:creationId xmlns:a16="http://schemas.microsoft.com/office/drawing/2014/main" id="{2212D99A-8E49-884F-9050-B055DF84C908}"/>
+                  </a:ext>
+                </a:extLst>
+              </p:cNvPr>
+              <p:cNvSpPr>
+                <a:spLocks noRot="1" noChangeAspect="1" noMove="1" noResize="1" noEditPoints="1" noAdjustHandles="1" noChangeArrowheads="1" noChangeShapeType="1" noTextEdit="1"/>
+              </p:cNvSpPr>
+              <p:nvPr/>
+            </p:nvSpPr>
+            <p:spPr>
+              <a:xfrm>
+                <a:off x="337760" y="1232922"/>
+                <a:ext cx="8517482" cy="2594172"/>
+              </a:xfrm>
+              <a:prstGeom prst="rect">
+                <a:avLst/>
+              </a:prstGeom>
+              <a:blipFill>
+                <a:blip r:embed="rId3"/>
+                <a:stretch>
+                  <a:fillRect l="-358" t="-704" b="-2113"/>
+                </a:stretch>
+              </a:blipFill>
+            </p:spPr>
+            <p:txBody>
+              <a:bodyPr/>
+              <a:lstStyle/>
+              <a:p>
+                <a:r>
+                  <a:rPr lang="en-US">
+                    <a:noFill/>
+                  </a:rPr>
+                  <a:t> </a:t>
+                </a:r>
+              </a:p>
+            </p:txBody>
+          </p:sp>
+        </mc:Fallback>
+      </mc:AlternateContent>
+    </p:spTree>
+    <p:extLst>
+      <p:ext uri="{BB962C8B-B14F-4D97-AF65-F5344CB8AC3E}">
+        <p14:creationId xmlns:p14="http://schemas.microsoft.com/office/powerpoint/2010/main" val="1918884322"/>
+      </p:ext>
+    </p:extLst>
+  </p:cSld>
+  <p:clrMapOvr>
+    <a:masterClrMapping/>
+  </p:clrMapOvr>
+</p:sld>
+</file>
+
+<file path=ppt/slides/slide16.xml><?xml version="1.0" encoding="utf-8"?>
+<p:sld xmlns:a="http://schemas.openxmlformats.org/drawingml/2006/main" xmlns:r="http://schemas.openxmlformats.org/officeDocument/2006/relationships" xmlns:p="http://schemas.openxmlformats.org/presentationml/2006/main">
+  <p:cSld>
+    <p:spTree>
+      <p:nvGrpSpPr>
+        <p:cNvPr id="1" name=""/>
+        <p:cNvGrpSpPr/>
+        <p:nvPr/>
+      </p:nvGrpSpPr>
+      <p:grpSpPr>
+        <a:xfrm>
+          <a:off x="0" y="0"/>
+          <a:ext cx="0" cy="0"/>
+          <a:chOff x="0" y="0"/>
+          <a:chExt cx="0" cy="0"/>
+        </a:xfrm>
+      </p:grpSpPr>
+      <p:sp>
+        <p:nvSpPr>
+          <p:cNvPr id="2" name="Title 1">
+            <a:extLst>
+              <a:ext uri="{FF2B5EF4-FFF2-40B4-BE49-F238E27FC236}">
+                <a16:creationId xmlns:a16="http://schemas.microsoft.com/office/drawing/2014/main" id="{AE921CF8-FF22-4247-8824-870CB296EE58}"/>
+              </a:ext>
+            </a:extLst>
+          </p:cNvPr>
+          <p:cNvSpPr>
+            <a:spLocks noGrp="1"/>
+          </p:cNvSpPr>
+          <p:nvPr>
+            <p:ph type="title"/>
+          </p:nvPr>
+        </p:nvSpPr>
+        <p:spPr/>
+        <p:txBody>
+          <a:bodyPr/>
+          <a:lstStyle/>
+          <a:p>
+            <a:r>
+              <a:rPr lang="en-US" dirty="0"/>
+              <a:t>Geo Weighted Regression</a:t>
+            </a:r>
+          </a:p>
+        </p:txBody>
+      </p:sp>
+      <p:sp>
+        <p:nvSpPr>
+          <p:cNvPr id="3" name="Text Placeholder 2">
+            <a:extLst>
+              <a:ext uri="{FF2B5EF4-FFF2-40B4-BE49-F238E27FC236}">
+                <a16:creationId xmlns:a16="http://schemas.microsoft.com/office/drawing/2014/main" id="{B25F14D8-9C39-FC42-8F7D-BEE528235EDA}"/>
+              </a:ext>
+            </a:extLst>
+          </p:cNvPr>
+          <p:cNvSpPr>
+            <a:spLocks noGrp="1"/>
+          </p:cNvSpPr>
+          <p:nvPr>
+            <p:ph type="body" sz="quarter" idx="10"/>
+          </p:nvPr>
+        </p:nvSpPr>
+        <p:spPr>
+          <a:xfrm>
+            <a:off x="337760" y="292626"/>
+            <a:ext cx="4234240" cy="279834"/>
+          </a:xfrm>
+        </p:spPr>
+        <p:txBody>
+          <a:bodyPr/>
+          <a:lstStyle/>
+          <a:p>
+            <a:r>
+              <a:rPr lang="en-US" dirty="0"/>
+              <a:t>3. Geographically Weighted Regression</a:t>
+            </a:r>
+          </a:p>
+        </p:txBody>
+      </p:sp>
+      <mc:AlternateContent xmlns:mc="http://schemas.openxmlformats.org/markup-compatibility/2006">
+        <mc:Choice xmlns:a14="http://schemas.microsoft.com/office/drawing/2010/main" Requires="a14">
+          <p:sp>
+            <p:nvSpPr>
+              <p:cNvPr id="5" name="Rectangle 4">
+                <a:extLst>
+                  <a:ext uri="{FF2B5EF4-FFF2-40B4-BE49-F238E27FC236}">
+                    <a16:creationId xmlns:a16="http://schemas.microsoft.com/office/drawing/2014/main" id="{2212D99A-8E49-884F-9050-B055DF84C908}"/>
+                  </a:ext>
+                </a:extLst>
+              </p:cNvPr>
+              <p:cNvSpPr/>
+              <p:nvPr/>
+            </p:nvSpPr>
+            <p:spPr>
+              <a:xfrm>
+                <a:off x="337760" y="1232922"/>
+                <a:ext cx="8517482" cy="2554545"/>
+              </a:xfrm>
+              <a:prstGeom prst="rect">
+                <a:avLst/>
+              </a:prstGeom>
+            </p:spPr>
+            <p:txBody>
+              <a:bodyPr wrap="square">
+                <a:spAutoFit/>
+              </a:bodyPr>
+              <a:lstStyle/>
+              <a:p>
+                <a:r>
+                  <a:rPr lang="en-US" sz="1600" dirty="0">
+                    <a:solidFill>
+                      <a:srgbClr val="333333"/>
+                    </a:solidFill>
+                    <a:latin typeface="Source Sans Pro" panose="020B0503030403020204" pitchFamily="34" charset="0"/>
+                  </a:rPr>
+                  <a:t>Spatial autocorrelation in the error terms result from measurement error, or from absent spatially autocorrelated variables influencing variables in the model. Spatial Error Model is formed as:</a:t>
+                </a:r>
+              </a:p>
+              <a:p>
+                <a:endParaRPr lang="en-US" sz="1600" dirty="0">
+                  <a:solidFill>
+                    <a:srgbClr val="333333"/>
+                  </a:solidFill>
+                  <a:latin typeface="Source Sans Pro" panose="020B0503030403020204" pitchFamily="34" charset="0"/>
+                </a:endParaRPr>
+              </a:p>
+              <a:p>
+                <a14:m>
+                  <m:oMathPara xmlns:m="http://schemas.openxmlformats.org/officeDocument/2006/math">
+                    <m:oMathParaPr>
+                      <m:jc m:val="centerGroup"/>
+                    </m:oMathParaPr>
+                    <m:oMath xmlns:m="http://schemas.openxmlformats.org/officeDocument/2006/math">
+                      <m:r>
+                        <a:rPr lang="en-US" sz="1600" b="0" i="1" smtClean="0">
+                          <a:latin typeface="Cambria Math" panose="02040503050406030204" pitchFamily="18" charset="0"/>
+                        </a:rPr>
+                        <m:t>𝑦</m:t>
+                      </m:r>
+                      <m:r>
+                        <a:rPr lang="en-US" sz="1600" b="0" i="1" smtClean="0">
+                          <a:latin typeface="Cambria Math" panose="02040503050406030204" pitchFamily="18" charset="0"/>
+                        </a:rPr>
+                        <m:t>=</m:t>
+                      </m:r>
+                      <m:r>
+                        <a:rPr lang="en-US" sz="1600" b="0" i="1" smtClean="0">
+                          <a:latin typeface="Cambria Math" panose="02040503050406030204" pitchFamily="18" charset="0"/>
+                        </a:rPr>
+                        <m:t>𝑋</m:t>
+                      </m:r>
+                      <m:r>
+                        <a:rPr lang="en-US" sz="1600" b="0" i="1" smtClean="0">
+                          <a:latin typeface="Cambria Math" panose="02040503050406030204" pitchFamily="18" charset="0"/>
+                        </a:rPr>
+                        <m:t>𝛽</m:t>
+                      </m:r>
+                      <m:r>
+                        <a:rPr lang="en-US" sz="1600" b="0" i="1" smtClean="0">
+                          <a:latin typeface="Cambria Math" panose="02040503050406030204" pitchFamily="18" charset="0"/>
+                        </a:rPr>
+                        <m:t>+</m:t>
+                      </m:r>
+                      <m:r>
+                        <a:rPr lang="en-US" sz="1600" b="0" i="1" smtClean="0">
+                          <a:latin typeface="Cambria Math" panose="02040503050406030204" pitchFamily="18" charset="0"/>
+                        </a:rPr>
+                        <m:t>𝑈</m:t>
+                      </m:r>
+                    </m:oMath>
+                  </m:oMathPara>
+                </a14:m>
+                <a:endParaRPr lang="en-US" sz="1600" b="0" dirty="0"/>
+              </a:p>
+              <a:p>
+                <a14:m>
+                  <m:oMathPara xmlns:m="http://schemas.openxmlformats.org/officeDocument/2006/math">
+                    <m:oMathParaPr>
+                      <m:jc m:val="centerGroup"/>
+                    </m:oMathParaPr>
+                    <m:oMath xmlns:m="http://schemas.openxmlformats.org/officeDocument/2006/math">
+                      <m:r>
+                        <a:rPr lang="en-US" sz="1600" b="0" i="1" smtClean="0">
+                          <a:latin typeface="Cambria Math" panose="02040503050406030204" pitchFamily="18" charset="0"/>
+                        </a:rPr>
+                        <m:t>𝑈</m:t>
+                      </m:r>
+                      <m:r>
+                        <a:rPr lang="en-US" sz="1600" b="0" i="1" smtClean="0">
+                          <a:latin typeface="Cambria Math" panose="02040503050406030204" pitchFamily="18" charset="0"/>
+                        </a:rPr>
+                        <m:t>=</m:t>
+                      </m:r>
+                      <m:r>
+                        <a:rPr lang="en-US" sz="1600" b="0" i="1" smtClean="0">
+                          <a:latin typeface="Cambria Math" panose="02040503050406030204" pitchFamily="18" charset="0"/>
+                        </a:rPr>
+                        <m:t>𝜌</m:t>
+                      </m:r>
+                      <m:r>
+                        <a:rPr lang="en-US" sz="1600" b="0" i="1" smtClean="0">
+                          <a:latin typeface="Cambria Math" panose="02040503050406030204" pitchFamily="18" charset="0"/>
+                        </a:rPr>
+                        <m:t>𝑊𝑢</m:t>
+                      </m:r>
+                      <m:r>
+                        <a:rPr lang="en-US" sz="1600" b="0" i="1" smtClean="0">
+                          <a:latin typeface="Cambria Math" panose="02040503050406030204" pitchFamily="18" charset="0"/>
+                        </a:rPr>
+                        <m:t>+</m:t>
+                      </m:r>
+                      <m:r>
+                        <a:rPr lang="en-US" sz="1600" b="0" i="1" smtClean="0">
+                          <a:latin typeface="Cambria Math" panose="02040503050406030204" pitchFamily="18" charset="0"/>
+                        </a:rPr>
+                        <m:t>𝜖</m:t>
+                      </m:r>
+                    </m:oMath>
+                  </m:oMathPara>
+                </a14:m>
+                <a:endParaRPr lang="en-US" sz="1600" b="0" dirty="0"/>
+              </a:p>
+              <a:p>
+                <a:endParaRPr lang="en-US" sz="1600" dirty="0"/>
+              </a:p>
+              <a:p>
+                <a:r>
+                  <a:rPr lang="en-US" sz="1600" dirty="0"/>
+                  <a:t>Where </a:t>
+                </a:r>
+                <a14:m>
+                  <m:oMath xmlns:m="http://schemas.openxmlformats.org/officeDocument/2006/math">
+                    <m:r>
+                      <a:rPr lang="en-US" sz="1600" b="0" i="1" smtClean="0">
+                        <a:latin typeface="Cambria Math" panose="02040503050406030204" pitchFamily="18" charset="0"/>
+                      </a:rPr>
+                      <m:t>𝑈</m:t>
+                    </m:r>
+                  </m:oMath>
+                </a14:m>
+                <a:r>
+                  <a:rPr lang="en-US" sz="1600" dirty="0"/>
+                  <a:t> is a composite error term including </a:t>
+                </a:r>
+                <a14:m>
+                  <m:oMath xmlns:m="http://schemas.openxmlformats.org/officeDocument/2006/math">
+                    <m:r>
+                      <a:rPr lang="en-US" sz="1600" b="0" i="1" smtClean="0">
+                        <a:latin typeface="Cambria Math" panose="02040503050406030204" pitchFamily="18" charset="0"/>
+                      </a:rPr>
+                      <m:t>𝜌</m:t>
+                    </m:r>
+                    <m:r>
+                      <a:rPr lang="en-US" sz="1600" b="0" i="1" smtClean="0">
+                        <a:latin typeface="Cambria Math" panose="02040503050406030204" pitchFamily="18" charset="0"/>
+                      </a:rPr>
+                      <m:t>𝑊𝑢</m:t>
+                    </m:r>
+                  </m:oMath>
+                </a14:m>
+                <a:r>
+                  <a:rPr lang="en-US" sz="1600" dirty="0"/>
+                  <a:t>, spatially autocorrelated errors, and </a:t>
+                </a:r>
+                <a14:m>
+                  <m:oMath xmlns:m="http://schemas.openxmlformats.org/officeDocument/2006/math">
+                    <m:r>
+                      <a:rPr lang="en-US" sz="1600" b="0" i="1" smtClean="0">
+                        <a:latin typeface="Cambria Math" panose="02040503050406030204" pitchFamily="18" charset="0"/>
+                      </a:rPr>
+                      <m:t>𝜖</m:t>
+                    </m:r>
+                  </m:oMath>
+                </a14:m>
+                <a:r>
+                  <a:rPr lang="en-US" sz="1600" dirty="0"/>
+                  <a:t>, the normal error term.</a:t>
+                </a:r>
+              </a:p>
+              <a:p>
+                <a:r>
+                  <a:rPr lang="en-US" sz="1600" dirty="0"/>
+                  <a:t>After the spatial lag/error model, the residuals can be tested if there is remaining spatial autocorrelation. To select between the spatial lag/error model, Lagrange Multiplier test is used.</a:t>
+                </a:r>
+              </a:p>
+            </p:txBody>
+          </p:sp>
+        </mc:Choice>
+        <mc:Fallback>
+          <p:sp>
+            <p:nvSpPr>
+              <p:cNvPr id="5" name="Rectangle 4">
+                <a:extLst>
+                  <a:ext uri="{FF2B5EF4-FFF2-40B4-BE49-F238E27FC236}">
+                    <a16:creationId xmlns:a16="http://schemas.microsoft.com/office/drawing/2014/main" id="{2212D99A-8E49-884F-9050-B055DF84C908}"/>
+                  </a:ext>
+                </a:extLst>
+              </p:cNvPr>
+              <p:cNvSpPr>
+                <a:spLocks noRot="1" noChangeAspect="1" noMove="1" noResize="1" noEditPoints="1" noAdjustHandles="1" noChangeArrowheads="1" noChangeShapeType="1" noTextEdit="1"/>
+              </p:cNvSpPr>
+              <p:nvPr/>
+            </p:nvSpPr>
+            <p:spPr>
+              <a:xfrm>
+                <a:off x="337760" y="1232922"/>
+                <a:ext cx="8517482" cy="2554545"/>
+              </a:xfrm>
+              <a:prstGeom prst="rect">
+                <a:avLst/>
+              </a:prstGeom>
+              <a:blipFill>
+                <a:blip r:embed="rId3"/>
+                <a:stretch>
+                  <a:fillRect l="-358" t="-716" r="-572" b="-2148"/>
+                </a:stretch>
+              </a:blipFill>
+            </p:spPr>
+            <p:txBody>
+              <a:bodyPr/>
+              <a:lstStyle/>
+              <a:p>
+                <a:r>
+                  <a:rPr lang="en-US">
+                    <a:noFill/>
+                  </a:rPr>
+                  <a:t> </a:t>
+                </a:r>
+              </a:p>
+            </p:txBody>
+          </p:sp>
+        </mc:Fallback>
+      </mc:AlternateContent>
+    </p:spTree>
+    <p:extLst>
+      <p:ext uri="{BB962C8B-B14F-4D97-AF65-F5344CB8AC3E}">
+        <p14:creationId xmlns:p14="http://schemas.microsoft.com/office/powerpoint/2010/main" val="2168433804"/>
+      </p:ext>
+    </p:extLst>
+  </p:cSld>
+  <p:clrMapOvr>
+    <a:masterClrMapping/>
+  </p:clrMapOvr>
+</p:sld>
+</file>
+
+<file path=ppt/slides/slide17.xml><?xml version="1.0" encoding="utf-8"?>
+<p:sld xmlns:a="http://schemas.openxmlformats.org/drawingml/2006/main" xmlns:r="http://schemas.openxmlformats.org/officeDocument/2006/relationships" xmlns:p="http://schemas.openxmlformats.org/presentationml/2006/main">
+  <p:cSld>
+    <p:spTree>
+      <p:nvGrpSpPr>
+        <p:cNvPr id="1" name=""/>
+        <p:cNvGrpSpPr/>
+        <p:nvPr/>
+      </p:nvGrpSpPr>
+      <p:grpSpPr>
+        <a:xfrm>
+          <a:off x="0" y="0"/>
+          <a:ext cx="0" cy="0"/>
+          <a:chOff x="0" y="0"/>
+          <a:chExt cx="0" cy="0"/>
+        </a:xfrm>
+      </p:grpSpPr>
+      <p:sp>
+        <p:nvSpPr>
+          <p:cNvPr id="2" name="Title 1">
+            <a:extLst>
+              <a:ext uri="{FF2B5EF4-FFF2-40B4-BE49-F238E27FC236}">
                 <a16:creationId xmlns:a16="http://schemas.microsoft.com/office/drawing/2014/main" id="{BFB7ED6D-C214-F941-B744-45E4AAADE29F}"/>
               </a:ext>
             </a:extLst>
@@ -3772,7 +5095,76 @@
           <a:p>
             <a:r>
               <a:rPr lang="en-US" dirty="0"/>
-              <a:t>EXTRA SLIDES</a:t>
+              <a:t>EXTRA Readings</a:t>
+            </a:r>
+          </a:p>
+        </p:txBody>
+      </p:sp>
+      <p:sp>
+        <p:nvSpPr>
+          <p:cNvPr id="3" name="Rectangle 2">
+            <a:extLst>
+              <a:ext uri="{FF2B5EF4-FFF2-40B4-BE49-F238E27FC236}">
+                <a16:creationId xmlns:a16="http://schemas.microsoft.com/office/drawing/2014/main" id="{D94DF0AB-BF78-4A72-B2CF-2479729FFC17}"/>
+              </a:ext>
+            </a:extLst>
+          </p:cNvPr>
+          <p:cNvSpPr/>
+          <p:nvPr/>
+        </p:nvSpPr>
+        <p:spPr>
+          <a:xfrm>
+            <a:off x="337760" y="1232922"/>
+            <a:ext cx="8517482" cy="2000548"/>
+          </a:xfrm>
+          <a:prstGeom prst="rect">
+            <a:avLst/>
+          </a:prstGeom>
+        </p:spPr>
+        <p:txBody>
+          <a:bodyPr wrap="square">
+            <a:spAutoFit/>
+          </a:bodyPr>
+          <a:lstStyle/>
+          <a:p>
+            <a:r>
+              <a:rPr lang="en-US" sz="1600" dirty="0"/>
+              <a:t>Cliff, A. D., &amp; Ord, J. K. (1981). Spatial processes: models &amp; applications. Taylor &amp; Francis.</a:t>
+            </a:r>
+          </a:p>
+          <a:p>
+            <a:endParaRPr lang="en-US" sz="2800" dirty="0">
+              <a:solidFill>
+                <a:srgbClr val="222222"/>
+              </a:solidFill>
+              <a:latin typeface="Arial" panose="020B0604020202020204" pitchFamily="34" charset="0"/>
+            </a:endParaRPr>
+          </a:p>
+          <a:p>
+            <a:r>
+              <a:rPr lang="en-US" sz="1600" dirty="0" err="1"/>
+              <a:t>Anselin</a:t>
+            </a:r>
+            <a:r>
+              <a:rPr lang="en-US" sz="1600" dirty="0"/>
+              <a:t>, L. (1988). Spatial Econometrics: Methods and Models (Vol. 4). Springer Science &amp; Business Media.</a:t>
+            </a:r>
+          </a:p>
+          <a:p>
+            <a:endParaRPr lang="en-US" sz="1600" dirty="0"/>
+          </a:p>
+          <a:p>
+            <a:r>
+              <a:rPr lang="en-US" sz="1600" dirty="0"/>
+              <a:t>Fotheringham, A. S., </a:t>
+            </a:r>
+            <a:r>
+              <a:rPr lang="en-US" sz="1600" dirty="0" err="1"/>
+              <a:t>Brunsdon</a:t>
+            </a:r>
+            <a:r>
+              <a:rPr lang="en-US" sz="1600" dirty="0"/>
+              <a:t>, C., &amp; Charlton, M. (2003). Geographically weighted regression: the analysis of spatially varying relationships. John Wiley &amp; Sons.</a:t>
             </a:r>
           </a:p>
         </p:txBody>
@@ -4573,8 +5965,8 @@
           </a:p>
         </p:txBody>
       </p:sp>
-      <mc:AlternateContent xmlns:mc="http://schemas.openxmlformats.org/markup-compatibility/2006">
-        <mc:Choice xmlns:a14="http://schemas.microsoft.com/office/drawing/2010/main" Requires="a14">
+      <mc:AlternateContent xmlns:mc="http://schemas.openxmlformats.org/markup-compatibility/2006" xmlns:a14="http://schemas.microsoft.com/office/drawing/2010/main">
+        <mc:Choice Requires="a14">
           <p:sp>
             <p:nvSpPr>
               <p:cNvPr id="6" name="TextBox 5">
@@ -4604,6 +5996,7 @@
               </a:bodyPr>
               <a:lstStyle/>
               <a:p>
+                <a:pPr/>
                 <a14:m>
                   <m:oMathPara xmlns:m="http://schemas.openxmlformats.org/officeDocument/2006/math">
                     <m:oMathParaPr>
@@ -4699,7 +6092,7 @@
             </p:txBody>
           </p:sp>
         </mc:Choice>
-        <mc:Fallback>
+        <mc:Fallback xmlns="">
           <p:sp>
             <p:nvSpPr>
               <p:cNvPr id="6" name="TextBox 5">

</xml_diff>